<commit_message>
Presentation edited -> db edited; difficulties slides
</commit_message>
<xml_diff>
--- a/presentation.pptx
+++ b/presentation.pptx
@@ -14,7 +14,8 @@
     <p:sldId id="259" r:id="rId8"/>
     <p:sldId id="263" r:id="rId9"/>
     <p:sldId id="266" r:id="rId10"/>
-    <p:sldId id="257" r:id="rId11"/>
+    <p:sldId id="267" r:id="rId11"/>
+    <p:sldId id="257" r:id="rId12"/>
   </p:sldIdLst>
   <p:sldSz cx="12192000" cy="6858000"/>
   <p:notesSz cx="6858000" cy="9144000"/>
@@ -130,7 +131,12 @@
             <p14:sldId id="261"/>
             <p14:sldId id="259"/>
             <p14:sldId id="263"/>
+          </p14:sldIdLst>
+        </p14:section>
+        <p14:section name="Сложности" id="{07EB4A5B-296E-4396-8C29-C03611592A50}">
+          <p14:sldIdLst>
             <p14:sldId id="266"/>
+            <p14:sldId id="267"/>
           </p14:sldIdLst>
         </p14:section>
         <p14:section name="Конец" id="{6A1A5D7F-0B46-4D01-96E1-E6A0EA2DEC10}">
@@ -278,7 +284,7 @@
           <a:p>
             <a:fld id="{48125BA4-6E50-49C4-993D-62049450E39B}" type="datetimeFigureOut">
               <a:rPr lang="ru-RU" smtClean="0"/>
-              <a:t>14.04.2022</a:t>
+              <a:t>18.04.2022</a:t>
             </a:fld>
             <a:endParaRPr lang="ru-RU"/>
           </a:p>
@@ -448,7 +454,7 @@
           <a:p>
             <a:fld id="{48125BA4-6E50-49C4-993D-62049450E39B}" type="datetimeFigureOut">
               <a:rPr lang="ru-RU" smtClean="0"/>
-              <a:t>14.04.2022</a:t>
+              <a:t>18.04.2022</a:t>
             </a:fld>
             <a:endParaRPr lang="ru-RU"/>
           </a:p>
@@ -628,7 +634,7 @@
           <a:p>
             <a:fld id="{48125BA4-6E50-49C4-993D-62049450E39B}" type="datetimeFigureOut">
               <a:rPr lang="ru-RU" smtClean="0"/>
-              <a:t>14.04.2022</a:t>
+              <a:t>18.04.2022</a:t>
             </a:fld>
             <a:endParaRPr lang="ru-RU"/>
           </a:p>
@@ -798,7 +804,7 @@
           <a:p>
             <a:fld id="{48125BA4-6E50-49C4-993D-62049450E39B}" type="datetimeFigureOut">
               <a:rPr lang="ru-RU" smtClean="0"/>
-              <a:t>14.04.2022</a:t>
+              <a:t>18.04.2022</a:t>
             </a:fld>
             <a:endParaRPr lang="ru-RU"/>
           </a:p>
@@ -1044,7 +1050,7 @@
           <a:p>
             <a:fld id="{48125BA4-6E50-49C4-993D-62049450E39B}" type="datetimeFigureOut">
               <a:rPr lang="ru-RU" smtClean="0"/>
-              <a:t>14.04.2022</a:t>
+              <a:t>18.04.2022</a:t>
             </a:fld>
             <a:endParaRPr lang="ru-RU"/>
           </a:p>
@@ -1276,7 +1282,7 @@
           <a:p>
             <a:fld id="{48125BA4-6E50-49C4-993D-62049450E39B}" type="datetimeFigureOut">
               <a:rPr lang="ru-RU" smtClean="0"/>
-              <a:t>14.04.2022</a:t>
+              <a:t>18.04.2022</a:t>
             </a:fld>
             <a:endParaRPr lang="ru-RU"/>
           </a:p>
@@ -1643,7 +1649,7 @@
           <a:p>
             <a:fld id="{48125BA4-6E50-49C4-993D-62049450E39B}" type="datetimeFigureOut">
               <a:rPr lang="ru-RU" smtClean="0"/>
-              <a:t>14.04.2022</a:t>
+              <a:t>18.04.2022</a:t>
             </a:fld>
             <a:endParaRPr lang="ru-RU"/>
           </a:p>
@@ -1761,7 +1767,7 @@
           <a:p>
             <a:fld id="{48125BA4-6E50-49C4-993D-62049450E39B}" type="datetimeFigureOut">
               <a:rPr lang="ru-RU" smtClean="0"/>
-              <a:t>14.04.2022</a:t>
+              <a:t>18.04.2022</a:t>
             </a:fld>
             <a:endParaRPr lang="ru-RU"/>
           </a:p>
@@ -1856,7 +1862,7 @@
           <a:p>
             <a:fld id="{48125BA4-6E50-49C4-993D-62049450E39B}" type="datetimeFigureOut">
               <a:rPr lang="ru-RU" smtClean="0"/>
-              <a:t>14.04.2022</a:t>
+              <a:t>18.04.2022</a:t>
             </a:fld>
             <a:endParaRPr lang="ru-RU"/>
           </a:p>
@@ -2133,7 +2139,7 @@
           <a:p>
             <a:fld id="{48125BA4-6E50-49C4-993D-62049450E39B}" type="datetimeFigureOut">
               <a:rPr lang="ru-RU" smtClean="0"/>
-              <a:t>14.04.2022</a:t>
+              <a:t>18.04.2022</a:t>
             </a:fld>
             <a:endParaRPr lang="ru-RU"/>
           </a:p>
@@ -2386,7 +2392,7 @@
           <a:p>
             <a:fld id="{48125BA4-6E50-49C4-993D-62049450E39B}" type="datetimeFigureOut">
               <a:rPr lang="ru-RU" smtClean="0"/>
-              <a:t>14.04.2022</a:t>
+              <a:t>18.04.2022</a:t>
             </a:fld>
             <a:endParaRPr lang="ru-RU"/>
           </a:p>
@@ -2609,7 +2615,7 @@
           <a:p>
             <a:fld id="{48125BA4-6E50-49C4-993D-62049450E39B}" type="datetimeFigureOut">
               <a:rPr lang="ru-RU" smtClean="0"/>
-              <a:t>14.04.2022</a:t>
+              <a:t>18.04.2022</a:t>
             </a:fld>
             <a:endParaRPr lang="ru-RU"/>
           </a:p>
@@ -3254,6 +3260,1392 @@
 <file path=ppt/slides/slide10.xml><?xml version="1.0" encoding="utf-8"?>
 <p:sld xmlns:a="http://schemas.openxmlformats.org/drawingml/2006/main" xmlns:r="http://schemas.openxmlformats.org/officeDocument/2006/relationships" xmlns:p="http://schemas.openxmlformats.org/presentationml/2006/main">
   <p:cSld>
+    <p:spTree>
+      <p:nvGrpSpPr>
+        <p:cNvPr id="1" name=""/>
+        <p:cNvGrpSpPr/>
+        <p:nvPr/>
+      </p:nvGrpSpPr>
+      <p:grpSpPr>
+        <a:xfrm>
+          <a:off x="0" y="0"/>
+          <a:ext cx="0" cy="0"/>
+          <a:chOff x="0" y="0"/>
+          <a:chExt cx="0" cy="0"/>
+        </a:xfrm>
+      </p:grpSpPr>
+      <p:sp>
+        <p:nvSpPr>
+          <p:cNvPr id="12" name="Заголовок 1">
+            <a:extLst>
+              <a:ext uri="{FF2B5EF4-FFF2-40B4-BE49-F238E27FC236}">
+                <a16:creationId xmlns:a16="http://schemas.microsoft.com/office/drawing/2014/main" id="{7E750E5C-E9B9-4E6B-8BA1-BCA18B63159D}"/>
+              </a:ext>
+            </a:extLst>
+          </p:cNvPr>
+          <p:cNvSpPr txBox="1">
+            <a:spLocks/>
+          </p:cNvSpPr>
+          <p:nvPr/>
+        </p:nvSpPr>
+        <p:spPr>
+          <a:xfrm>
+            <a:off x="1471749" y="138748"/>
+            <a:ext cx="9309462" cy="730450"/>
+          </a:xfrm>
+          <a:prstGeom prst="rect">
+            <a:avLst/>
+          </a:prstGeom>
+        </p:spPr>
+        <p:txBody>
+          <a:bodyPr vert="horz" lIns="91440" tIns="45720" rIns="91440" bIns="45720" rtlCol="0" anchor="b">
+            <a:noAutofit/>
+          </a:bodyPr>
+          <a:lstStyle>
+            <a:lvl1pPr algn="ctr" defTabSz="914400" rtl="0" eaLnBrk="1" latinLnBrk="0" hangingPunct="1">
+              <a:lnSpc>
+                <a:spcPct val="90000"/>
+              </a:lnSpc>
+              <a:spcBef>
+                <a:spcPct val="0"/>
+              </a:spcBef>
+              <a:buNone/>
+              <a:defRPr sz="6000" kern="1200">
+                <a:solidFill>
+                  <a:schemeClr val="tx1"/>
+                </a:solidFill>
+                <a:latin typeface="+mj-lt"/>
+                <a:ea typeface="+mj-ea"/>
+                <a:cs typeface="+mj-cs"/>
+              </a:defRPr>
+            </a:lvl1pPr>
+          </a:lstStyle>
+          <a:p>
+            <a:r>
+              <a:rPr lang="ru-RU" sz="6023" b="1" dirty="0" smtClean="0">
+                <a:latin typeface="Bahnschrift Condensed" panose="020B0502040204020203" pitchFamily="34" charset="0"/>
+              </a:rPr>
+              <a:t>Бот и сайт как единая программа</a:t>
+            </a:r>
+            <a:endParaRPr lang="ru-RU" sz="6023" b="1" dirty="0">
+              <a:latin typeface="Bahnschrift Condensed" panose="020B0502040204020203" pitchFamily="34" charset="0"/>
+            </a:endParaRPr>
+          </a:p>
+        </p:txBody>
+      </p:sp>
+      <p:sp>
+        <p:nvSpPr>
+          <p:cNvPr id="30" name="TextBox 29"/>
+          <p:cNvSpPr txBox="1"/>
+          <p:nvPr/>
+        </p:nvSpPr>
+        <p:spPr>
+          <a:xfrm>
+            <a:off x="4937473" y="2647045"/>
+            <a:ext cx="1497846" cy="646331"/>
+          </a:xfrm>
+          <a:prstGeom prst="rect">
+            <a:avLst/>
+          </a:prstGeom>
+          <a:solidFill>
+            <a:schemeClr val="bg1">
+              <a:lumMod val="50000"/>
+            </a:schemeClr>
+          </a:solidFill>
+          <a:ln>
+            <a:solidFill>
+              <a:schemeClr val="tx1"/>
+            </a:solidFill>
+          </a:ln>
+        </p:spPr>
+        <p:txBody>
+          <a:bodyPr wrap="none" rtlCol="0">
+            <a:spAutoFit/>
+          </a:bodyPr>
+          <a:lstStyle/>
+          <a:p>
+            <a:r>
+              <a:rPr lang="en-US" sz="3600" dirty="0" smtClean="0"/>
+              <a:t>Thread</a:t>
+            </a:r>
+            <a:endParaRPr lang="ru-RU" sz="3600" dirty="0"/>
+          </a:p>
+        </p:txBody>
+      </p:sp>
+      <p:sp>
+        <p:nvSpPr>
+          <p:cNvPr id="31" name="TextBox 30"/>
+          <p:cNvSpPr txBox="1"/>
+          <p:nvPr/>
+        </p:nvSpPr>
+        <p:spPr>
+          <a:xfrm>
+            <a:off x="7492186" y="2647045"/>
+            <a:ext cx="880241" cy="646331"/>
+          </a:xfrm>
+          <a:prstGeom prst="rect">
+            <a:avLst/>
+          </a:prstGeom>
+          <a:solidFill>
+            <a:schemeClr val="bg1">
+              <a:lumMod val="50000"/>
+            </a:schemeClr>
+          </a:solidFill>
+          <a:ln>
+            <a:solidFill>
+              <a:schemeClr val="tx1"/>
+            </a:solidFill>
+          </a:ln>
+        </p:spPr>
+        <p:txBody>
+          <a:bodyPr wrap="none" rtlCol="0">
+            <a:spAutoFit/>
+          </a:bodyPr>
+          <a:lstStyle/>
+          <a:p>
+            <a:r>
+              <a:rPr lang="en-US" sz="3600" dirty="0" smtClean="0"/>
+              <a:t>Site</a:t>
+            </a:r>
+            <a:endParaRPr lang="ru-RU" sz="3600" dirty="0"/>
+          </a:p>
+        </p:txBody>
+      </p:sp>
+      <p:cxnSp>
+        <p:nvCxnSpPr>
+          <p:cNvPr id="35" name="Прямая со стрелкой 34"/>
+          <p:cNvCxnSpPr>
+            <a:stCxn id="30" idx="3"/>
+            <a:endCxn id="31" idx="1"/>
+          </p:cNvCxnSpPr>
+          <p:nvPr/>
+        </p:nvCxnSpPr>
+        <p:spPr>
+          <a:xfrm>
+            <a:off x="6435319" y="2970211"/>
+            <a:ext cx="1056867" cy="0"/>
+          </a:xfrm>
+          <a:prstGeom prst="straightConnector1">
+            <a:avLst/>
+          </a:prstGeom>
+          <a:ln w="19050">
+            <a:solidFill>
+              <a:schemeClr val="tx1"/>
+            </a:solidFill>
+            <a:tailEnd type="triangle"/>
+          </a:ln>
+        </p:spPr>
+        <p:style>
+          <a:lnRef idx="1">
+            <a:schemeClr val="accent1"/>
+          </a:lnRef>
+          <a:fillRef idx="0">
+            <a:schemeClr val="accent1"/>
+          </a:fillRef>
+          <a:effectRef idx="0">
+            <a:schemeClr val="accent1"/>
+          </a:effectRef>
+          <a:fontRef idx="minor">
+            <a:schemeClr val="tx1"/>
+          </a:fontRef>
+        </p:style>
+      </p:cxnSp>
+      <p:sp>
+        <p:nvSpPr>
+          <p:cNvPr id="39" name="TextBox 38"/>
+          <p:cNvSpPr txBox="1"/>
+          <p:nvPr/>
+        </p:nvSpPr>
+        <p:spPr>
+          <a:xfrm>
+            <a:off x="4654543" y="1129623"/>
+            <a:ext cx="2063706" cy="646331"/>
+          </a:xfrm>
+          <a:prstGeom prst="rect">
+            <a:avLst/>
+          </a:prstGeom>
+          <a:solidFill>
+            <a:schemeClr val="bg1">
+              <a:lumMod val="50000"/>
+            </a:schemeClr>
+          </a:solidFill>
+          <a:ln>
+            <a:solidFill>
+              <a:schemeClr val="tx1"/>
+            </a:solidFill>
+          </a:ln>
+        </p:spPr>
+        <p:txBody>
+          <a:bodyPr wrap="none" rtlCol="0">
+            <a:spAutoFit/>
+          </a:bodyPr>
+          <a:lstStyle/>
+          <a:p>
+            <a:r>
+              <a:rPr lang="en-US" sz="3600" dirty="0" smtClean="0"/>
+              <a:t>Threading</a:t>
+            </a:r>
+            <a:endParaRPr lang="ru-RU" sz="3600" dirty="0"/>
+          </a:p>
+        </p:txBody>
+      </p:sp>
+      <p:cxnSp>
+        <p:nvCxnSpPr>
+          <p:cNvPr id="40" name="Прямая со стрелкой 39"/>
+          <p:cNvCxnSpPr>
+            <a:stCxn id="39" idx="2"/>
+            <a:endCxn id="30" idx="0"/>
+          </p:cNvCxnSpPr>
+          <p:nvPr/>
+        </p:nvCxnSpPr>
+        <p:spPr>
+          <a:xfrm>
+            <a:off x="5686396" y="1775954"/>
+            <a:ext cx="0" cy="871091"/>
+          </a:xfrm>
+          <a:prstGeom prst="straightConnector1">
+            <a:avLst/>
+          </a:prstGeom>
+          <a:ln w="19050">
+            <a:solidFill>
+              <a:schemeClr val="tx1"/>
+            </a:solidFill>
+            <a:tailEnd type="triangle"/>
+          </a:ln>
+        </p:spPr>
+        <p:style>
+          <a:lnRef idx="1">
+            <a:schemeClr val="accent1"/>
+          </a:lnRef>
+          <a:fillRef idx="0">
+            <a:schemeClr val="accent1"/>
+          </a:fillRef>
+          <a:effectRef idx="0">
+            <a:schemeClr val="accent1"/>
+          </a:effectRef>
+          <a:fontRef idx="minor">
+            <a:schemeClr val="tx1"/>
+          </a:fontRef>
+        </p:style>
+      </p:cxnSp>
+      <p:cxnSp>
+        <p:nvCxnSpPr>
+          <p:cNvPr id="41" name="Прямая со стрелкой 40"/>
+          <p:cNvCxnSpPr>
+            <a:stCxn id="42" idx="0"/>
+            <a:endCxn id="45" idx="2"/>
+          </p:cNvCxnSpPr>
+          <p:nvPr/>
+        </p:nvCxnSpPr>
+        <p:spPr>
+          <a:xfrm flipV="1">
+            <a:off x="5686395" y="4810798"/>
+            <a:ext cx="1" cy="871090"/>
+          </a:xfrm>
+          <a:prstGeom prst="straightConnector1">
+            <a:avLst/>
+          </a:prstGeom>
+          <a:ln w="19050">
+            <a:solidFill>
+              <a:schemeClr val="tx1"/>
+            </a:solidFill>
+            <a:tailEnd type="triangle"/>
+          </a:ln>
+        </p:spPr>
+        <p:style>
+          <a:lnRef idx="1">
+            <a:schemeClr val="accent1"/>
+          </a:lnRef>
+          <a:fillRef idx="0">
+            <a:schemeClr val="accent1"/>
+          </a:fillRef>
+          <a:effectRef idx="0">
+            <a:schemeClr val="accent1"/>
+          </a:effectRef>
+          <a:fontRef idx="minor">
+            <a:schemeClr val="tx1"/>
+          </a:fontRef>
+        </p:style>
+      </p:cxnSp>
+      <p:sp>
+        <p:nvSpPr>
+          <p:cNvPr id="42" name="TextBox 41"/>
+          <p:cNvSpPr txBox="1"/>
+          <p:nvPr/>
+        </p:nvSpPr>
+        <p:spPr>
+          <a:xfrm>
+            <a:off x="4876077" y="5681888"/>
+            <a:ext cx="1620636" cy="646331"/>
+          </a:xfrm>
+          <a:prstGeom prst="rect">
+            <a:avLst/>
+          </a:prstGeom>
+          <a:solidFill>
+            <a:schemeClr val="bg1">
+              <a:lumMod val="50000"/>
+            </a:schemeClr>
+          </a:solidFill>
+          <a:ln>
+            <a:solidFill>
+              <a:schemeClr val="tx1"/>
+            </a:solidFill>
+          </a:ln>
+        </p:spPr>
+        <p:txBody>
+          <a:bodyPr wrap="none" rtlCol="0">
+            <a:spAutoFit/>
+          </a:bodyPr>
+          <a:lstStyle/>
+          <a:p>
+            <a:r>
+              <a:rPr lang="en-US" sz="3600" dirty="0" err="1" smtClean="0"/>
+              <a:t>Asyncio</a:t>
+            </a:r>
+            <a:endParaRPr lang="ru-RU" sz="3600" dirty="0"/>
+          </a:p>
+        </p:txBody>
+      </p:sp>
+      <p:sp>
+        <p:nvSpPr>
+          <p:cNvPr id="45" name="TextBox 44"/>
+          <p:cNvSpPr txBox="1"/>
+          <p:nvPr/>
+        </p:nvSpPr>
+        <p:spPr>
+          <a:xfrm>
+            <a:off x="4481219" y="4164467"/>
+            <a:ext cx="2410353" cy="646331"/>
+          </a:xfrm>
+          <a:prstGeom prst="rect">
+            <a:avLst/>
+          </a:prstGeom>
+          <a:solidFill>
+            <a:schemeClr val="bg1">
+              <a:lumMod val="50000"/>
+            </a:schemeClr>
+          </a:solidFill>
+          <a:ln>
+            <a:solidFill>
+              <a:schemeClr val="tx1"/>
+            </a:solidFill>
+          </a:ln>
+        </p:spPr>
+        <p:txBody>
+          <a:bodyPr wrap="square" rtlCol="0">
+            <a:spAutoFit/>
+          </a:bodyPr>
+          <a:lstStyle/>
+          <a:p>
+            <a:r>
+              <a:rPr lang="en-US" sz="3600" dirty="0" smtClean="0"/>
+              <a:t>Discord bot</a:t>
+            </a:r>
+            <a:endParaRPr lang="ru-RU" sz="3600" dirty="0"/>
+          </a:p>
+        </p:txBody>
+      </p:sp>
+      <p:sp>
+        <p:nvSpPr>
+          <p:cNvPr id="120" name="TextBox 119"/>
+          <p:cNvSpPr txBox="1"/>
+          <p:nvPr/>
+        </p:nvSpPr>
+        <p:spPr>
+          <a:xfrm>
+            <a:off x="2278032" y="1129623"/>
+            <a:ext cx="1481303" cy="646331"/>
+          </a:xfrm>
+          <a:prstGeom prst="rect">
+            <a:avLst/>
+          </a:prstGeom>
+          <a:solidFill>
+            <a:schemeClr val="bg1">
+              <a:lumMod val="50000"/>
+            </a:schemeClr>
+          </a:solidFill>
+          <a:ln>
+            <a:solidFill>
+              <a:schemeClr val="tx1"/>
+            </a:solidFill>
+          </a:ln>
+        </p:spPr>
+        <p:txBody>
+          <a:bodyPr wrap="none" rtlCol="0">
+            <a:spAutoFit/>
+          </a:bodyPr>
+          <a:lstStyle/>
+          <a:p>
+            <a:r>
+              <a:rPr lang="ru-RU" sz="3600" dirty="0" smtClean="0"/>
+              <a:t>Запуск</a:t>
+            </a:r>
+            <a:endParaRPr lang="ru-RU" sz="3600" dirty="0"/>
+          </a:p>
+        </p:txBody>
+      </p:sp>
+      <p:sp>
+        <p:nvSpPr>
+          <p:cNvPr id="121" name="TextBox 120"/>
+          <p:cNvSpPr txBox="1"/>
+          <p:nvPr/>
+        </p:nvSpPr>
+        <p:spPr>
+          <a:xfrm>
+            <a:off x="2800066" y="2647044"/>
+            <a:ext cx="418704" cy="646331"/>
+          </a:xfrm>
+          <a:prstGeom prst="rect">
+            <a:avLst/>
+          </a:prstGeom>
+          <a:solidFill>
+            <a:schemeClr val="bg1">
+              <a:lumMod val="50000"/>
+            </a:schemeClr>
+          </a:solidFill>
+          <a:ln>
+            <a:solidFill>
+              <a:schemeClr val="tx1"/>
+            </a:solidFill>
+          </a:ln>
+        </p:spPr>
+        <p:txBody>
+          <a:bodyPr wrap="none" rtlCol="0">
+            <a:spAutoFit/>
+          </a:bodyPr>
+          <a:lstStyle/>
+          <a:p>
+            <a:r>
+              <a:rPr lang="ru-RU" sz="3600" dirty="0" smtClean="0"/>
+              <a:t>1</a:t>
+            </a:r>
+            <a:endParaRPr lang="ru-RU" sz="3600" dirty="0"/>
+          </a:p>
+        </p:txBody>
+      </p:sp>
+      <p:cxnSp>
+        <p:nvCxnSpPr>
+          <p:cNvPr id="130" name="Прямая со стрелкой 129"/>
+          <p:cNvCxnSpPr>
+            <a:stCxn id="120" idx="2"/>
+            <a:endCxn id="121" idx="0"/>
+          </p:cNvCxnSpPr>
+          <p:nvPr/>
+        </p:nvCxnSpPr>
+        <p:spPr>
+          <a:xfrm flipH="1">
+            <a:off x="3009418" y="1775954"/>
+            <a:ext cx="9266" cy="871090"/>
+          </a:xfrm>
+          <a:prstGeom prst="straightConnector1">
+            <a:avLst/>
+          </a:prstGeom>
+          <a:ln w="19050">
+            <a:solidFill>
+              <a:schemeClr val="tx1"/>
+            </a:solidFill>
+            <a:tailEnd type="triangle"/>
+          </a:ln>
+        </p:spPr>
+        <p:style>
+          <a:lnRef idx="1">
+            <a:schemeClr val="accent1"/>
+          </a:lnRef>
+          <a:fillRef idx="0">
+            <a:schemeClr val="accent1"/>
+          </a:fillRef>
+          <a:effectRef idx="0">
+            <a:schemeClr val="accent1"/>
+          </a:effectRef>
+          <a:fontRef idx="minor">
+            <a:schemeClr val="tx1"/>
+          </a:fontRef>
+        </p:style>
+      </p:cxnSp>
+      <p:cxnSp>
+        <p:nvCxnSpPr>
+          <p:cNvPr id="133" name="Прямая со стрелкой 132"/>
+          <p:cNvCxnSpPr>
+            <a:stCxn id="121" idx="3"/>
+            <a:endCxn id="30" idx="1"/>
+          </p:cNvCxnSpPr>
+          <p:nvPr/>
+        </p:nvCxnSpPr>
+        <p:spPr>
+          <a:xfrm>
+            <a:off x="3218770" y="2970210"/>
+            <a:ext cx="1718703" cy="1"/>
+          </a:xfrm>
+          <a:prstGeom prst="straightConnector1">
+            <a:avLst/>
+          </a:prstGeom>
+          <a:ln w="19050">
+            <a:solidFill>
+              <a:schemeClr val="tx1"/>
+            </a:solidFill>
+            <a:tailEnd type="triangle"/>
+          </a:ln>
+        </p:spPr>
+        <p:style>
+          <a:lnRef idx="1">
+            <a:schemeClr val="accent1"/>
+          </a:lnRef>
+          <a:fillRef idx="0">
+            <a:schemeClr val="accent1"/>
+          </a:fillRef>
+          <a:effectRef idx="0">
+            <a:schemeClr val="accent1"/>
+          </a:effectRef>
+          <a:fontRef idx="minor">
+            <a:schemeClr val="tx1"/>
+          </a:fontRef>
+        </p:style>
+      </p:cxnSp>
+      <p:sp>
+        <p:nvSpPr>
+          <p:cNvPr id="139" name="TextBox 138"/>
+          <p:cNvSpPr txBox="1"/>
+          <p:nvPr/>
+        </p:nvSpPr>
+        <p:spPr>
+          <a:xfrm>
+            <a:off x="2800066" y="4164467"/>
+            <a:ext cx="418704" cy="646331"/>
+          </a:xfrm>
+          <a:prstGeom prst="rect">
+            <a:avLst/>
+          </a:prstGeom>
+          <a:solidFill>
+            <a:schemeClr val="bg1">
+              <a:lumMod val="50000"/>
+            </a:schemeClr>
+          </a:solidFill>
+          <a:ln>
+            <a:solidFill>
+              <a:schemeClr val="tx1"/>
+            </a:solidFill>
+          </a:ln>
+        </p:spPr>
+        <p:txBody>
+          <a:bodyPr wrap="none" rtlCol="0">
+            <a:spAutoFit/>
+          </a:bodyPr>
+          <a:lstStyle/>
+          <a:p>
+            <a:r>
+              <a:rPr lang="ru-RU" sz="3600" dirty="0" smtClean="0"/>
+              <a:t>2</a:t>
+            </a:r>
+            <a:endParaRPr lang="ru-RU" sz="3600" dirty="0"/>
+          </a:p>
+        </p:txBody>
+      </p:sp>
+      <p:cxnSp>
+        <p:nvCxnSpPr>
+          <p:cNvPr id="140" name="Прямая со стрелкой 139"/>
+          <p:cNvCxnSpPr>
+            <a:stCxn id="121" idx="2"/>
+            <a:endCxn id="139" idx="0"/>
+          </p:cNvCxnSpPr>
+          <p:nvPr/>
+        </p:nvCxnSpPr>
+        <p:spPr>
+          <a:xfrm>
+            <a:off x="3009418" y="3293375"/>
+            <a:ext cx="0" cy="871092"/>
+          </a:xfrm>
+          <a:prstGeom prst="straightConnector1">
+            <a:avLst/>
+          </a:prstGeom>
+          <a:ln w="19050">
+            <a:solidFill>
+              <a:schemeClr val="tx1"/>
+            </a:solidFill>
+            <a:tailEnd type="triangle"/>
+          </a:ln>
+        </p:spPr>
+        <p:style>
+          <a:lnRef idx="1">
+            <a:schemeClr val="accent1"/>
+          </a:lnRef>
+          <a:fillRef idx="0">
+            <a:schemeClr val="accent1"/>
+          </a:fillRef>
+          <a:effectRef idx="0">
+            <a:schemeClr val="accent1"/>
+          </a:effectRef>
+          <a:fontRef idx="minor">
+            <a:schemeClr val="tx1"/>
+          </a:fontRef>
+        </p:style>
+      </p:cxnSp>
+      <p:cxnSp>
+        <p:nvCxnSpPr>
+          <p:cNvPr id="143" name="Прямая со стрелкой 142"/>
+          <p:cNvCxnSpPr>
+            <a:stCxn id="139" idx="3"/>
+            <a:endCxn id="45" idx="1"/>
+          </p:cNvCxnSpPr>
+          <p:nvPr/>
+        </p:nvCxnSpPr>
+        <p:spPr>
+          <a:xfrm>
+            <a:off x="3218770" y="4487633"/>
+            <a:ext cx="1262449" cy="0"/>
+          </a:xfrm>
+          <a:prstGeom prst="straightConnector1">
+            <a:avLst/>
+          </a:prstGeom>
+          <a:ln w="19050">
+            <a:solidFill>
+              <a:schemeClr val="tx1"/>
+            </a:solidFill>
+            <a:tailEnd type="triangle"/>
+          </a:ln>
+        </p:spPr>
+        <p:style>
+          <a:lnRef idx="1">
+            <a:schemeClr val="accent1"/>
+          </a:lnRef>
+          <a:fillRef idx="0">
+            <a:schemeClr val="accent1"/>
+          </a:fillRef>
+          <a:effectRef idx="0">
+            <a:schemeClr val="accent1"/>
+          </a:effectRef>
+          <a:fontRef idx="minor">
+            <a:schemeClr val="tx1"/>
+          </a:fontRef>
+        </p:style>
+      </p:cxnSp>
+      <p:cxnSp>
+        <p:nvCxnSpPr>
+          <p:cNvPr id="165" name="Соединительная линия уступом 164"/>
+          <p:cNvCxnSpPr>
+            <a:stCxn id="31" idx="2"/>
+            <a:endCxn id="45" idx="3"/>
+          </p:cNvCxnSpPr>
+          <p:nvPr/>
+        </p:nvCxnSpPr>
+        <p:spPr>
+          <a:xfrm rot="5400000">
+            <a:off x="6814812" y="3370137"/>
+            <a:ext cx="1194257" cy="1040735"/>
+          </a:xfrm>
+          <a:prstGeom prst="bentConnector2">
+            <a:avLst/>
+          </a:prstGeom>
+          <a:ln w="19050">
+            <a:solidFill>
+              <a:schemeClr val="tx1"/>
+            </a:solidFill>
+            <a:tailEnd type="triangle"/>
+          </a:ln>
+        </p:spPr>
+        <p:style>
+          <a:lnRef idx="1">
+            <a:schemeClr val="accent1"/>
+          </a:lnRef>
+          <a:fillRef idx="0">
+            <a:schemeClr val="accent1"/>
+          </a:fillRef>
+          <a:effectRef idx="0">
+            <a:schemeClr val="accent1"/>
+          </a:effectRef>
+          <a:fontRef idx="minor">
+            <a:schemeClr val="tx1"/>
+          </a:fontRef>
+        </p:style>
+      </p:cxnSp>
+    </p:spTree>
+    <p:extLst>
+      <p:ext uri="{BB962C8B-B14F-4D97-AF65-F5344CB8AC3E}">
+        <p14:creationId xmlns:p14="http://schemas.microsoft.com/office/powerpoint/2010/main" val="3008942535"/>
+      </p:ext>
+    </p:extLst>
+  </p:cSld>
+  <p:clrMapOvr>
+    <a:masterClrMapping/>
+  </p:clrMapOvr>
+  <p:timing>
+    <p:tnLst>
+      <p:par>
+        <p:cTn id="1" dur="indefinite" restart="never" nodeType="tmRoot">
+          <p:childTnLst>
+            <p:seq concurrent="1" nextAc="seek">
+              <p:cTn id="2" dur="indefinite" nodeType="mainSeq">
+                <p:childTnLst>
+                  <p:par>
+                    <p:cTn id="3" fill="hold">
+                      <p:stCondLst>
+                        <p:cond delay="indefinite"/>
+                      </p:stCondLst>
+                      <p:childTnLst>
+                        <p:par>
+                          <p:cTn id="4" fill="hold">
+                            <p:stCondLst>
+                              <p:cond delay="0"/>
+                            </p:stCondLst>
+                            <p:childTnLst>
+                              <p:par>
+                                <p:cTn id="5" presetID="10" presetClass="entr" presetSubtype="0" fill="hold" grpId="0" nodeType="clickEffect">
+                                  <p:stCondLst>
+                                    <p:cond delay="0"/>
+                                  </p:stCondLst>
+                                  <p:childTnLst>
+                                    <p:set>
+                                      <p:cBhvr>
+                                        <p:cTn id="6" dur="1" fill="hold">
+                                          <p:stCondLst>
+                                            <p:cond delay="0"/>
+                                          </p:stCondLst>
+                                        </p:cTn>
+                                        <p:tgtEl>
+                                          <p:spTgt spid="39"/>
+                                        </p:tgtEl>
+                                        <p:attrNameLst>
+                                          <p:attrName>style.visibility</p:attrName>
+                                        </p:attrNameLst>
+                                      </p:cBhvr>
+                                      <p:to>
+                                        <p:strVal val="visible"/>
+                                      </p:to>
+                                    </p:set>
+                                    <p:animEffect transition="in" filter="fade">
+                                      <p:cBhvr>
+                                        <p:cTn id="7" dur="500"/>
+                                        <p:tgtEl>
+                                          <p:spTgt spid="39"/>
+                                        </p:tgtEl>
+                                      </p:cBhvr>
+                                    </p:animEffect>
+                                  </p:childTnLst>
+                                </p:cTn>
+                              </p:par>
+                            </p:childTnLst>
+                          </p:cTn>
+                        </p:par>
+                      </p:childTnLst>
+                    </p:cTn>
+                  </p:par>
+                  <p:par>
+                    <p:cTn id="8" fill="hold">
+                      <p:stCondLst>
+                        <p:cond delay="indefinite"/>
+                      </p:stCondLst>
+                      <p:childTnLst>
+                        <p:par>
+                          <p:cTn id="9" fill="hold">
+                            <p:stCondLst>
+                              <p:cond delay="0"/>
+                            </p:stCondLst>
+                            <p:childTnLst>
+                              <p:par>
+                                <p:cTn id="10" presetID="10" presetClass="entr" presetSubtype="0" fill="hold" nodeType="clickEffect">
+                                  <p:stCondLst>
+                                    <p:cond delay="0"/>
+                                  </p:stCondLst>
+                                  <p:childTnLst>
+                                    <p:set>
+                                      <p:cBhvr>
+                                        <p:cTn id="11" dur="1" fill="hold">
+                                          <p:stCondLst>
+                                            <p:cond delay="0"/>
+                                          </p:stCondLst>
+                                        </p:cTn>
+                                        <p:tgtEl>
+                                          <p:spTgt spid="41"/>
+                                        </p:tgtEl>
+                                        <p:attrNameLst>
+                                          <p:attrName>style.visibility</p:attrName>
+                                        </p:attrNameLst>
+                                      </p:cBhvr>
+                                      <p:to>
+                                        <p:strVal val="visible"/>
+                                      </p:to>
+                                    </p:set>
+                                    <p:animEffect transition="in" filter="fade">
+                                      <p:cBhvr>
+                                        <p:cTn id="12" dur="500"/>
+                                        <p:tgtEl>
+                                          <p:spTgt spid="41"/>
+                                        </p:tgtEl>
+                                      </p:cBhvr>
+                                    </p:animEffect>
+                                  </p:childTnLst>
+                                </p:cTn>
+                              </p:par>
+                              <p:par>
+                                <p:cTn id="13" presetID="10" presetClass="entr" presetSubtype="0" fill="hold" grpId="0" nodeType="withEffect">
+                                  <p:stCondLst>
+                                    <p:cond delay="0"/>
+                                  </p:stCondLst>
+                                  <p:childTnLst>
+                                    <p:set>
+                                      <p:cBhvr>
+                                        <p:cTn id="14" dur="1" fill="hold">
+                                          <p:stCondLst>
+                                            <p:cond delay="0"/>
+                                          </p:stCondLst>
+                                        </p:cTn>
+                                        <p:tgtEl>
+                                          <p:spTgt spid="42"/>
+                                        </p:tgtEl>
+                                        <p:attrNameLst>
+                                          <p:attrName>style.visibility</p:attrName>
+                                        </p:attrNameLst>
+                                      </p:cBhvr>
+                                      <p:to>
+                                        <p:strVal val="visible"/>
+                                      </p:to>
+                                    </p:set>
+                                    <p:animEffect transition="in" filter="fade">
+                                      <p:cBhvr>
+                                        <p:cTn id="15" dur="500"/>
+                                        <p:tgtEl>
+                                          <p:spTgt spid="42"/>
+                                        </p:tgtEl>
+                                      </p:cBhvr>
+                                    </p:animEffect>
+                                  </p:childTnLst>
+                                </p:cTn>
+                              </p:par>
+                              <p:par>
+                                <p:cTn id="16" presetID="10" presetClass="entr" presetSubtype="0" fill="hold" grpId="0" nodeType="withEffect">
+                                  <p:stCondLst>
+                                    <p:cond delay="0"/>
+                                  </p:stCondLst>
+                                  <p:childTnLst>
+                                    <p:set>
+                                      <p:cBhvr>
+                                        <p:cTn id="17" dur="1" fill="hold">
+                                          <p:stCondLst>
+                                            <p:cond delay="0"/>
+                                          </p:stCondLst>
+                                        </p:cTn>
+                                        <p:tgtEl>
+                                          <p:spTgt spid="45"/>
+                                        </p:tgtEl>
+                                        <p:attrNameLst>
+                                          <p:attrName>style.visibility</p:attrName>
+                                        </p:attrNameLst>
+                                      </p:cBhvr>
+                                      <p:to>
+                                        <p:strVal val="visible"/>
+                                      </p:to>
+                                    </p:set>
+                                    <p:animEffect transition="in" filter="fade">
+                                      <p:cBhvr>
+                                        <p:cTn id="18" dur="500"/>
+                                        <p:tgtEl>
+                                          <p:spTgt spid="45"/>
+                                        </p:tgtEl>
+                                      </p:cBhvr>
+                                    </p:animEffect>
+                                  </p:childTnLst>
+                                </p:cTn>
+                              </p:par>
+                            </p:childTnLst>
+                          </p:cTn>
+                        </p:par>
+                      </p:childTnLst>
+                    </p:cTn>
+                  </p:par>
+                  <p:par>
+                    <p:cTn id="19" fill="hold">
+                      <p:stCondLst>
+                        <p:cond delay="indefinite"/>
+                      </p:stCondLst>
+                      <p:childTnLst>
+                        <p:par>
+                          <p:cTn id="20" fill="hold">
+                            <p:stCondLst>
+                              <p:cond delay="0"/>
+                            </p:stCondLst>
+                            <p:childTnLst>
+                              <p:par>
+                                <p:cTn id="21" presetID="22" presetClass="entr" presetSubtype="1" fill="hold" grpId="0" nodeType="clickEffect">
+                                  <p:stCondLst>
+                                    <p:cond delay="0"/>
+                                  </p:stCondLst>
+                                  <p:childTnLst>
+                                    <p:set>
+                                      <p:cBhvr>
+                                        <p:cTn id="22" dur="1" fill="hold">
+                                          <p:stCondLst>
+                                            <p:cond delay="0"/>
+                                          </p:stCondLst>
+                                        </p:cTn>
+                                        <p:tgtEl>
+                                          <p:spTgt spid="30"/>
+                                        </p:tgtEl>
+                                        <p:attrNameLst>
+                                          <p:attrName>style.visibility</p:attrName>
+                                        </p:attrNameLst>
+                                      </p:cBhvr>
+                                      <p:to>
+                                        <p:strVal val="visible"/>
+                                      </p:to>
+                                    </p:set>
+                                    <p:animEffect transition="in" filter="wipe(up)">
+                                      <p:cBhvr>
+                                        <p:cTn id="23" dur="500"/>
+                                        <p:tgtEl>
+                                          <p:spTgt spid="30"/>
+                                        </p:tgtEl>
+                                      </p:cBhvr>
+                                    </p:animEffect>
+                                  </p:childTnLst>
+                                </p:cTn>
+                              </p:par>
+                              <p:par>
+                                <p:cTn id="24" presetID="22" presetClass="entr" presetSubtype="1" fill="hold" nodeType="withEffect">
+                                  <p:stCondLst>
+                                    <p:cond delay="0"/>
+                                  </p:stCondLst>
+                                  <p:childTnLst>
+                                    <p:set>
+                                      <p:cBhvr>
+                                        <p:cTn id="25" dur="1" fill="hold">
+                                          <p:stCondLst>
+                                            <p:cond delay="0"/>
+                                          </p:stCondLst>
+                                        </p:cTn>
+                                        <p:tgtEl>
+                                          <p:spTgt spid="35"/>
+                                        </p:tgtEl>
+                                        <p:attrNameLst>
+                                          <p:attrName>style.visibility</p:attrName>
+                                        </p:attrNameLst>
+                                      </p:cBhvr>
+                                      <p:to>
+                                        <p:strVal val="visible"/>
+                                      </p:to>
+                                    </p:set>
+                                    <p:animEffect transition="in" filter="wipe(up)">
+                                      <p:cBhvr>
+                                        <p:cTn id="26" dur="500"/>
+                                        <p:tgtEl>
+                                          <p:spTgt spid="35"/>
+                                        </p:tgtEl>
+                                      </p:cBhvr>
+                                    </p:animEffect>
+                                  </p:childTnLst>
+                                </p:cTn>
+                              </p:par>
+                              <p:par>
+                                <p:cTn id="27" presetID="22" presetClass="entr" presetSubtype="1" fill="hold" grpId="0" nodeType="withEffect">
+                                  <p:stCondLst>
+                                    <p:cond delay="0"/>
+                                  </p:stCondLst>
+                                  <p:childTnLst>
+                                    <p:set>
+                                      <p:cBhvr>
+                                        <p:cTn id="28" dur="1" fill="hold">
+                                          <p:stCondLst>
+                                            <p:cond delay="0"/>
+                                          </p:stCondLst>
+                                        </p:cTn>
+                                        <p:tgtEl>
+                                          <p:spTgt spid="31"/>
+                                        </p:tgtEl>
+                                        <p:attrNameLst>
+                                          <p:attrName>style.visibility</p:attrName>
+                                        </p:attrNameLst>
+                                      </p:cBhvr>
+                                      <p:to>
+                                        <p:strVal val="visible"/>
+                                      </p:to>
+                                    </p:set>
+                                    <p:animEffect transition="in" filter="wipe(up)">
+                                      <p:cBhvr>
+                                        <p:cTn id="29" dur="500"/>
+                                        <p:tgtEl>
+                                          <p:spTgt spid="31"/>
+                                        </p:tgtEl>
+                                      </p:cBhvr>
+                                    </p:animEffect>
+                                  </p:childTnLst>
+                                </p:cTn>
+                              </p:par>
+                              <p:par>
+                                <p:cTn id="30" presetID="10" presetClass="entr" presetSubtype="0" fill="hold" nodeType="withEffect">
+                                  <p:stCondLst>
+                                    <p:cond delay="0"/>
+                                  </p:stCondLst>
+                                  <p:childTnLst>
+                                    <p:set>
+                                      <p:cBhvr>
+                                        <p:cTn id="31" dur="1" fill="hold">
+                                          <p:stCondLst>
+                                            <p:cond delay="0"/>
+                                          </p:stCondLst>
+                                        </p:cTn>
+                                        <p:tgtEl>
+                                          <p:spTgt spid="40"/>
+                                        </p:tgtEl>
+                                        <p:attrNameLst>
+                                          <p:attrName>style.visibility</p:attrName>
+                                        </p:attrNameLst>
+                                      </p:cBhvr>
+                                      <p:to>
+                                        <p:strVal val="visible"/>
+                                      </p:to>
+                                    </p:set>
+                                    <p:animEffect transition="in" filter="fade">
+                                      <p:cBhvr>
+                                        <p:cTn id="32" dur="500"/>
+                                        <p:tgtEl>
+                                          <p:spTgt spid="40"/>
+                                        </p:tgtEl>
+                                      </p:cBhvr>
+                                    </p:animEffect>
+                                  </p:childTnLst>
+                                </p:cTn>
+                              </p:par>
+                            </p:childTnLst>
+                          </p:cTn>
+                        </p:par>
+                      </p:childTnLst>
+                    </p:cTn>
+                  </p:par>
+                  <p:par>
+                    <p:cTn id="33" fill="hold">
+                      <p:stCondLst>
+                        <p:cond delay="indefinite"/>
+                      </p:stCondLst>
+                      <p:childTnLst>
+                        <p:par>
+                          <p:cTn id="34" fill="hold">
+                            <p:stCondLst>
+                              <p:cond delay="0"/>
+                            </p:stCondLst>
+                            <p:childTnLst>
+                              <p:par>
+                                <p:cTn id="35" presetID="10" presetClass="entr" presetSubtype="0" fill="hold" grpId="0" nodeType="clickEffect">
+                                  <p:stCondLst>
+                                    <p:cond delay="0"/>
+                                  </p:stCondLst>
+                                  <p:childTnLst>
+                                    <p:set>
+                                      <p:cBhvr>
+                                        <p:cTn id="36" dur="1" fill="hold">
+                                          <p:stCondLst>
+                                            <p:cond delay="0"/>
+                                          </p:stCondLst>
+                                        </p:cTn>
+                                        <p:tgtEl>
+                                          <p:spTgt spid="120"/>
+                                        </p:tgtEl>
+                                        <p:attrNameLst>
+                                          <p:attrName>style.visibility</p:attrName>
+                                        </p:attrNameLst>
+                                      </p:cBhvr>
+                                      <p:to>
+                                        <p:strVal val="visible"/>
+                                      </p:to>
+                                    </p:set>
+                                    <p:animEffect transition="in" filter="fade">
+                                      <p:cBhvr>
+                                        <p:cTn id="37" dur="500"/>
+                                        <p:tgtEl>
+                                          <p:spTgt spid="120"/>
+                                        </p:tgtEl>
+                                      </p:cBhvr>
+                                    </p:animEffect>
+                                  </p:childTnLst>
+                                </p:cTn>
+                              </p:par>
+                            </p:childTnLst>
+                          </p:cTn>
+                        </p:par>
+                      </p:childTnLst>
+                    </p:cTn>
+                  </p:par>
+                  <p:par>
+                    <p:cTn id="38" fill="hold">
+                      <p:stCondLst>
+                        <p:cond delay="indefinite"/>
+                      </p:stCondLst>
+                      <p:childTnLst>
+                        <p:par>
+                          <p:cTn id="39" fill="hold">
+                            <p:stCondLst>
+                              <p:cond delay="0"/>
+                            </p:stCondLst>
+                            <p:childTnLst>
+                              <p:par>
+                                <p:cTn id="40" presetID="10" presetClass="entr" presetSubtype="0" fill="hold" grpId="0" nodeType="clickEffect">
+                                  <p:stCondLst>
+                                    <p:cond delay="0"/>
+                                  </p:stCondLst>
+                                  <p:childTnLst>
+                                    <p:set>
+                                      <p:cBhvr>
+                                        <p:cTn id="41" dur="1" fill="hold">
+                                          <p:stCondLst>
+                                            <p:cond delay="0"/>
+                                          </p:stCondLst>
+                                        </p:cTn>
+                                        <p:tgtEl>
+                                          <p:spTgt spid="121"/>
+                                        </p:tgtEl>
+                                        <p:attrNameLst>
+                                          <p:attrName>style.visibility</p:attrName>
+                                        </p:attrNameLst>
+                                      </p:cBhvr>
+                                      <p:to>
+                                        <p:strVal val="visible"/>
+                                      </p:to>
+                                    </p:set>
+                                    <p:animEffect transition="in" filter="fade">
+                                      <p:cBhvr>
+                                        <p:cTn id="42" dur="500"/>
+                                        <p:tgtEl>
+                                          <p:spTgt spid="121"/>
+                                        </p:tgtEl>
+                                      </p:cBhvr>
+                                    </p:animEffect>
+                                  </p:childTnLst>
+                                </p:cTn>
+                              </p:par>
+                              <p:par>
+                                <p:cTn id="43" presetID="10" presetClass="entr" presetSubtype="0" fill="hold" nodeType="withEffect">
+                                  <p:stCondLst>
+                                    <p:cond delay="0"/>
+                                  </p:stCondLst>
+                                  <p:childTnLst>
+                                    <p:set>
+                                      <p:cBhvr>
+                                        <p:cTn id="44" dur="1" fill="hold">
+                                          <p:stCondLst>
+                                            <p:cond delay="0"/>
+                                          </p:stCondLst>
+                                        </p:cTn>
+                                        <p:tgtEl>
+                                          <p:spTgt spid="130"/>
+                                        </p:tgtEl>
+                                        <p:attrNameLst>
+                                          <p:attrName>style.visibility</p:attrName>
+                                        </p:attrNameLst>
+                                      </p:cBhvr>
+                                      <p:to>
+                                        <p:strVal val="visible"/>
+                                      </p:to>
+                                    </p:set>
+                                    <p:animEffect transition="in" filter="fade">
+                                      <p:cBhvr>
+                                        <p:cTn id="45" dur="500"/>
+                                        <p:tgtEl>
+                                          <p:spTgt spid="130"/>
+                                        </p:tgtEl>
+                                      </p:cBhvr>
+                                    </p:animEffect>
+                                  </p:childTnLst>
+                                </p:cTn>
+                              </p:par>
+                              <p:par>
+                                <p:cTn id="46" presetID="10" presetClass="entr" presetSubtype="0" fill="hold" nodeType="withEffect">
+                                  <p:stCondLst>
+                                    <p:cond delay="0"/>
+                                  </p:stCondLst>
+                                  <p:childTnLst>
+                                    <p:set>
+                                      <p:cBhvr>
+                                        <p:cTn id="47" dur="1" fill="hold">
+                                          <p:stCondLst>
+                                            <p:cond delay="0"/>
+                                          </p:stCondLst>
+                                        </p:cTn>
+                                        <p:tgtEl>
+                                          <p:spTgt spid="133"/>
+                                        </p:tgtEl>
+                                        <p:attrNameLst>
+                                          <p:attrName>style.visibility</p:attrName>
+                                        </p:attrNameLst>
+                                      </p:cBhvr>
+                                      <p:to>
+                                        <p:strVal val="visible"/>
+                                      </p:to>
+                                    </p:set>
+                                    <p:animEffect transition="in" filter="fade">
+                                      <p:cBhvr>
+                                        <p:cTn id="48" dur="500"/>
+                                        <p:tgtEl>
+                                          <p:spTgt spid="133"/>
+                                        </p:tgtEl>
+                                      </p:cBhvr>
+                                    </p:animEffect>
+                                  </p:childTnLst>
+                                </p:cTn>
+                              </p:par>
+                            </p:childTnLst>
+                          </p:cTn>
+                        </p:par>
+                      </p:childTnLst>
+                    </p:cTn>
+                  </p:par>
+                  <p:par>
+                    <p:cTn id="49" fill="hold">
+                      <p:stCondLst>
+                        <p:cond delay="indefinite"/>
+                      </p:stCondLst>
+                      <p:childTnLst>
+                        <p:par>
+                          <p:cTn id="50" fill="hold">
+                            <p:stCondLst>
+                              <p:cond delay="0"/>
+                            </p:stCondLst>
+                            <p:childTnLst>
+                              <p:par>
+                                <p:cTn id="51" presetID="10" presetClass="entr" presetSubtype="0" fill="hold" grpId="0" nodeType="clickEffect">
+                                  <p:stCondLst>
+                                    <p:cond delay="0"/>
+                                  </p:stCondLst>
+                                  <p:childTnLst>
+                                    <p:set>
+                                      <p:cBhvr>
+                                        <p:cTn id="52" dur="1" fill="hold">
+                                          <p:stCondLst>
+                                            <p:cond delay="0"/>
+                                          </p:stCondLst>
+                                        </p:cTn>
+                                        <p:tgtEl>
+                                          <p:spTgt spid="139"/>
+                                        </p:tgtEl>
+                                        <p:attrNameLst>
+                                          <p:attrName>style.visibility</p:attrName>
+                                        </p:attrNameLst>
+                                      </p:cBhvr>
+                                      <p:to>
+                                        <p:strVal val="visible"/>
+                                      </p:to>
+                                    </p:set>
+                                    <p:animEffect transition="in" filter="fade">
+                                      <p:cBhvr>
+                                        <p:cTn id="53" dur="500"/>
+                                        <p:tgtEl>
+                                          <p:spTgt spid="139"/>
+                                        </p:tgtEl>
+                                      </p:cBhvr>
+                                    </p:animEffect>
+                                  </p:childTnLst>
+                                </p:cTn>
+                              </p:par>
+                              <p:par>
+                                <p:cTn id="54" presetID="10" presetClass="entr" presetSubtype="0" fill="hold" nodeType="withEffect">
+                                  <p:stCondLst>
+                                    <p:cond delay="0"/>
+                                  </p:stCondLst>
+                                  <p:childTnLst>
+                                    <p:set>
+                                      <p:cBhvr>
+                                        <p:cTn id="55" dur="1" fill="hold">
+                                          <p:stCondLst>
+                                            <p:cond delay="0"/>
+                                          </p:stCondLst>
+                                        </p:cTn>
+                                        <p:tgtEl>
+                                          <p:spTgt spid="140"/>
+                                        </p:tgtEl>
+                                        <p:attrNameLst>
+                                          <p:attrName>style.visibility</p:attrName>
+                                        </p:attrNameLst>
+                                      </p:cBhvr>
+                                      <p:to>
+                                        <p:strVal val="visible"/>
+                                      </p:to>
+                                    </p:set>
+                                    <p:animEffect transition="in" filter="fade">
+                                      <p:cBhvr>
+                                        <p:cTn id="56" dur="500"/>
+                                        <p:tgtEl>
+                                          <p:spTgt spid="140"/>
+                                        </p:tgtEl>
+                                      </p:cBhvr>
+                                    </p:animEffect>
+                                  </p:childTnLst>
+                                </p:cTn>
+                              </p:par>
+                              <p:par>
+                                <p:cTn id="57" presetID="10" presetClass="entr" presetSubtype="0" fill="hold" nodeType="withEffect">
+                                  <p:stCondLst>
+                                    <p:cond delay="0"/>
+                                  </p:stCondLst>
+                                  <p:childTnLst>
+                                    <p:set>
+                                      <p:cBhvr>
+                                        <p:cTn id="58" dur="1" fill="hold">
+                                          <p:stCondLst>
+                                            <p:cond delay="0"/>
+                                          </p:stCondLst>
+                                        </p:cTn>
+                                        <p:tgtEl>
+                                          <p:spTgt spid="143"/>
+                                        </p:tgtEl>
+                                        <p:attrNameLst>
+                                          <p:attrName>style.visibility</p:attrName>
+                                        </p:attrNameLst>
+                                      </p:cBhvr>
+                                      <p:to>
+                                        <p:strVal val="visible"/>
+                                      </p:to>
+                                    </p:set>
+                                    <p:animEffect transition="in" filter="fade">
+                                      <p:cBhvr>
+                                        <p:cTn id="59" dur="500"/>
+                                        <p:tgtEl>
+                                          <p:spTgt spid="143"/>
+                                        </p:tgtEl>
+                                      </p:cBhvr>
+                                    </p:animEffect>
+                                  </p:childTnLst>
+                                </p:cTn>
+                              </p:par>
+                            </p:childTnLst>
+                          </p:cTn>
+                        </p:par>
+                      </p:childTnLst>
+                    </p:cTn>
+                  </p:par>
+                </p:childTnLst>
+              </p:cTn>
+              <p:prevCondLst>
+                <p:cond evt="onPrev" delay="0">
+                  <p:tgtEl>
+                    <p:sldTgt/>
+                  </p:tgtEl>
+                </p:cond>
+              </p:prevCondLst>
+              <p:nextCondLst>
+                <p:cond evt="onNext" delay="0">
+                  <p:tgtEl>
+                    <p:sldTgt/>
+                  </p:tgtEl>
+                </p:cond>
+              </p:nextCondLst>
+            </p:seq>
+          </p:childTnLst>
+        </p:cTn>
+      </p:par>
+    </p:tnLst>
+    <p:bldLst>
+      <p:bldP spid="30" grpId="0" animBg="1"/>
+      <p:bldP spid="31" grpId="0" animBg="1"/>
+      <p:bldP spid="39" grpId="0" animBg="1"/>
+      <p:bldP spid="42" grpId="0" animBg="1"/>
+      <p:bldP spid="45" grpId="0" animBg="1"/>
+      <p:bldP spid="120" grpId="0" animBg="1"/>
+      <p:bldP spid="121" grpId="0" animBg="1"/>
+      <p:bldP spid="139" grpId="0" animBg="1"/>
+    </p:bldLst>
+  </p:timing>
+</p:sld>
+</file>
+
+<file path=ppt/slides/slide11.xml><?xml version="1.0" encoding="utf-8"?>
+<p:sld xmlns:a="http://schemas.openxmlformats.org/drawingml/2006/main" xmlns:r="http://schemas.openxmlformats.org/officeDocument/2006/relationships" xmlns:p="http://schemas.openxmlformats.org/presentationml/2006/main">
+  <p:cSld>
     <p:bg>
       <p:bgPr>
         <a:blipFill dpi="0" rotWithShape="1">
@@ -3959,8 +5351,8 @@
         </p:blipFill>
         <p:spPr>
           <a:xfrm>
-            <a:off x="1766593" y="986496"/>
-            <a:ext cx="8309060" cy="5621338"/>
+            <a:off x="2220687" y="1113500"/>
+            <a:ext cx="7820296" cy="5132638"/>
           </a:xfrm>
           <a:prstGeom prst="rect">
             <a:avLst/>
@@ -3980,86 +5372,7 @@
   <p:timing>
     <p:tnLst>
       <p:par>
-        <p:cTn id="1" dur="indefinite" restart="never" nodeType="tmRoot">
-          <p:childTnLst>
-            <p:seq concurrent="1" nextAc="seek">
-              <p:cTn id="2" dur="indefinite" nodeType="mainSeq">
-                <p:childTnLst>
-                  <p:par>
-                    <p:cTn id="3" fill="hold">
-                      <p:stCondLst>
-                        <p:cond delay="indefinite"/>
-                        <p:cond evt="onBegin" delay="0">
-                          <p:tn val="2"/>
-                        </p:cond>
-                      </p:stCondLst>
-                      <p:childTnLst>
-                        <p:par>
-                          <p:cTn id="4" fill="hold">
-                            <p:stCondLst>
-                              <p:cond delay="0"/>
-                            </p:stCondLst>
-                            <p:childTnLst>
-                              <p:par>
-                                <p:cTn id="5" presetID="22" presetClass="entr" presetSubtype="4" fill="hold" nodeType="withEffect">
-                                  <p:stCondLst>
-                                    <p:cond delay="0"/>
-                                  </p:stCondLst>
-                                  <p:childTnLst>
-                                    <p:set>
-                                      <p:cBhvr>
-                                        <p:cTn id="6" dur="1" fill="hold">
-                                          <p:stCondLst>
-                                            <p:cond delay="0"/>
-                                          </p:stCondLst>
-                                        </p:cTn>
-                                        <p:tgtEl>
-                                          <p:spTgt spid="3"/>
-                                        </p:tgtEl>
-                                        <p:attrNameLst>
-                                          <p:attrName>style.visibility</p:attrName>
-                                        </p:attrNameLst>
-                                      </p:cBhvr>
-                                      <p:to>
-                                        <p:strVal val="visible"/>
-                                      </p:to>
-                                    </p:set>
-                                    <p:animEffect transition="in" filter="wipe(down)">
-                                      <p:cBhvr>
-                                        <p:cTn id="7" dur="500"/>
-                                        <p:tgtEl>
-                                          <p:spTgt spid="3"/>
-                                        </p:tgtEl>
-                                      </p:cBhvr>
-                                    </p:animEffect>
-                                  </p:childTnLst>
-                                </p:cTn>
-                              </p:par>
-                            </p:childTnLst>
-                          </p:cTn>
-                        </p:par>
-                      </p:childTnLst>
-                    </p:cTn>
-                  </p:par>
-                </p:childTnLst>
-              </p:cTn>
-              <p:prevCondLst>
-                <p:cond evt="onPrev" delay="0">
-                  <p:tgtEl>
-                    <p:sldTgt/>
-                  </p:tgtEl>
-                </p:cond>
-              </p:prevCondLst>
-              <p:nextCondLst>
-                <p:cond evt="onNext" delay="0">
-                  <p:tgtEl>
-                    <p:sldTgt/>
-                  </p:tgtEl>
-                </p:cond>
-              </p:nextCondLst>
-            </p:seq>
-          </p:childTnLst>
-        </p:cTn>
+        <p:cTn id="1" dur="indefinite" restart="never" nodeType="tmRoot"/>
       </p:par>
     </p:tnLst>
   </p:timing>
@@ -5758,10 +7071,10 @@
         </p:nvGrpSpPr>
         <p:grpSpPr>
           <a:xfrm>
-            <a:off x="243078" y="970350"/>
-            <a:ext cx="2642616" cy="2888418"/>
+            <a:off x="243078" y="970349"/>
+            <a:ext cx="2642616" cy="3109807"/>
             <a:chOff x="5794248" y="1463040"/>
-            <a:chExt cx="2642616" cy="2615184"/>
+            <a:chExt cx="2642616" cy="2615183"/>
           </a:xfrm>
         </p:grpSpPr>
         <p:sp>
@@ -5835,7 +7148,7 @@
           <p:spPr>
             <a:xfrm>
               <a:off x="5794248" y="1725168"/>
-              <a:ext cx="2642616" cy="2353056"/>
+              <a:ext cx="2642616" cy="2353055"/>
             </a:xfrm>
             <a:prstGeom prst="rect">
               <a:avLst/>
@@ -6004,6 +7317,38 @@
                   </a:solidFill>
                 </a:rPr>
                 <a:t>is_online</a:t>
+              </a:r>
+              <a:r>
+                <a:rPr lang="en-US" dirty="0" smtClean="0">
+                  <a:solidFill>
+                    <a:schemeClr val="tx1"/>
+                  </a:solidFill>
+                </a:rPr>
+                <a:t>: </a:t>
+              </a:r>
+              <a:r>
+                <a:rPr lang="en-US" dirty="0" err="1" smtClean="0">
+                  <a:solidFill>
+                    <a:schemeClr val="tx1"/>
+                  </a:solidFill>
+                </a:rPr>
+                <a:t>boolean</a:t>
+              </a:r>
+              <a:endParaRPr lang="en-US" dirty="0" smtClean="0">
+                <a:solidFill>
+                  <a:schemeClr val="tx1"/>
+                </a:solidFill>
+              </a:endParaRPr>
+            </a:p>
+            <a:p>
+              <a:pPr algn="ctr"/>
+              <a:r>
+                <a:rPr lang="en-US" dirty="0" err="1" smtClean="0">
+                  <a:solidFill>
+                    <a:schemeClr val="tx1"/>
+                  </a:solidFill>
+                </a:rPr>
+                <a:t>Is_active</a:t>
               </a:r>
               <a:r>
                 <a:rPr lang="en-US" dirty="0" smtClean="0">
@@ -6287,9 +7632,9 @@
         <p:grpSpPr>
           <a:xfrm>
             <a:off x="8221218" y="2442946"/>
-            <a:ext cx="3464814" cy="1527272"/>
+            <a:ext cx="3464814" cy="1748744"/>
             <a:chOff x="1719072" y="1188720"/>
-            <a:chExt cx="2642616" cy="1357884"/>
+            <a:chExt cx="2642616" cy="1450389"/>
           </a:xfrm>
         </p:grpSpPr>
         <p:sp>
@@ -6363,7 +7708,7 @@
           <p:spPr>
             <a:xfrm>
               <a:off x="1719072" y="1463040"/>
-              <a:ext cx="2642616" cy="1083564"/>
+              <a:ext cx="2642616" cy="1176069"/>
             </a:xfrm>
             <a:prstGeom prst="rect">
               <a:avLst/>
@@ -6451,6 +7796,33 @@
             <a:p>
               <a:pPr algn="ctr"/>
               <a:r>
+                <a:rPr lang="en-US" dirty="0" err="1">
+                  <a:solidFill>
+                    <a:schemeClr val="tx1"/>
+                  </a:solidFill>
+                </a:rPr>
+                <a:t>k</a:t>
+              </a:r>
+              <a:r>
+                <a:rPr lang="en-US" dirty="0" err="1" smtClean="0">
+                  <a:solidFill>
+                    <a:schemeClr val="tx1"/>
+                  </a:solidFill>
+                </a:rPr>
+                <a:t>ey_name</a:t>
+              </a:r>
+              <a:r>
+                <a:rPr lang="en-US" dirty="0" smtClean="0">
+                  <a:solidFill>
+                    <a:schemeClr val="tx1"/>
+                  </a:solidFill>
+                </a:rPr>
+                <a:t>: string</a:t>
+              </a:r>
+            </a:p>
+            <a:p>
+              <a:pPr algn="ctr"/>
+              <a:r>
                 <a:rPr lang="en-US" dirty="0" smtClean="0">
                   <a:solidFill>
                     <a:schemeClr val="tx1"/>
@@ -6470,8 +7842,8 @@
         </p:nvGrpSpPr>
         <p:grpSpPr>
           <a:xfrm>
-            <a:off x="8221218" y="1003935"/>
-            <a:ext cx="3464814" cy="1183386"/>
+            <a:off x="8221218" y="1003934"/>
+            <a:ext cx="3464814" cy="1289157"/>
             <a:chOff x="1719072" y="1188720"/>
             <a:chExt cx="2642616" cy="1183386"/>
           </a:xfrm>
@@ -6842,7 +8214,7 @@
         </p:nvGrpSpPr>
         <p:grpSpPr>
           <a:xfrm>
-            <a:off x="8221218" y="4227866"/>
+            <a:off x="8221218" y="4373373"/>
             <a:ext cx="3464814" cy="992886"/>
             <a:chOff x="1719072" y="1188720"/>
             <a:chExt cx="2642616" cy="992886"/>
@@ -7986,7 +9358,7 @@
           </p:nvCxnSpPr>
           <p:spPr>
             <a:xfrm>
-              <a:off x="7589520" y="1595628"/>
+              <a:off x="7589520" y="1612402"/>
               <a:ext cx="1600200" cy="0"/>
             </a:xfrm>
             <a:prstGeom prst="straightConnector1">
@@ -8054,9 +9426,9 @@
         <p:grpSpPr>
           <a:xfrm>
             <a:off x="6500788" y="3011658"/>
-            <a:ext cx="2432900" cy="2023986"/>
+            <a:ext cx="2432900" cy="2139302"/>
             <a:chOff x="6500788" y="2991586"/>
-            <a:chExt cx="2432900" cy="2023986"/>
+            <a:chExt cx="2432900" cy="2139302"/>
           </a:xfrm>
         </p:grpSpPr>
         <p:cxnSp>
@@ -8106,12 +9478,12 @@
           </p:nvCxnSpPr>
           <p:spPr>
             <a:xfrm rot="10800000">
-              <a:off x="7845552" y="4728651"/>
-              <a:ext cx="1088136" cy="286921"/>
+              <a:off x="7845552" y="4728653"/>
+              <a:ext cx="1088136" cy="402235"/>
             </a:xfrm>
             <a:prstGeom prst="bentConnector3">
               <a:avLst>
-                <a:gd name="adj1" fmla="val 99580"/>
+                <a:gd name="adj1" fmla="val 98820"/>
               </a:avLst>
             </a:prstGeom>
             <a:ln w="57150">
@@ -8146,7 +9518,7 @@
         <p:spPr>
           <a:xfrm rot="10800000">
             <a:off x="7173468" y="4248588"/>
-            <a:ext cx="1760220" cy="480060"/>
+            <a:ext cx="1760220" cy="628050"/>
           </a:xfrm>
           <a:prstGeom prst="bentConnector3">
             <a:avLst/>

</xml_diff>

<commit_message>
Animation presentation bugs fixed
</commit_message>
<xml_diff>
--- a/presentation.pptx
+++ b/presentation.pptx
@@ -195,10 +195,9 @@
           </a:lstStyle>
           <a:p>
             <a:r>
-              <a:rPr lang="ru-RU" smtClean="0"/>
+              <a:rPr lang="ru-RU"/>
               <a:t>Образец заголовка</a:t>
             </a:r>
-            <a:endParaRPr lang="ru-RU"/>
           </a:p>
         </p:txBody>
       </p:sp>
@@ -260,10 +259,9 @@
           </a:lstStyle>
           <a:p>
             <a:r>
-              <a:rPr lang="ru-RU" smtClean="0"/>
+              <a:rPr lang="ru-RU"/>
               <a:t>Образец подзаголовка</a:t>
             </a:r>
-            <a:endParaRPr lang="ru-RU"/>
           </a:p>
         </p:txBody>
       </p:sp>
@@ -284,7 +282,7 @@
           <a:p>
             <a:fld id="{48125BA4-6E50-49C4-993D-62049450E39B}" type="datetimeFigureOut">
               <a:rPr lang="ru-RU" smtClean="0"/>
-              <a:t>18.04.2022</a:t>
+              <a:t>25.04.2022</a:t>
             </a:fld>
             <a:endParaRPr lang="ru-RU"/>
           </a:p>
@@ -378,10 +376,9 @@
           <a:lstStyle/>
           <a:p>
             <a:r>
-              <a:rPr lang="ru-RU" smtClean="0"/>
+              <a:rPr lang="ru-RU"/>
               <a:t>Образец заголовка</a:t>
             </a:r>
-            <a:endParaRPr lang="ru-RU"/>
           </a:p>
         </p:txBody>
       </p:sp>
@@ -402,38 +399,37 @@
           <a:p>
             <a:pPr lvl="0"/>
             <a:r>
-              <a:rPr lang="ru-RU" smtClean="0"/>
+              <a:rPr lang="ru-RU"/>
               <a:t>Образец текста</a:t>
             </a:r>
           </a:p>
           <a:p>
             <a:pPr lvl="1"/>
             <a:r>
-              <a:rPr lang="ru-RU" smtClean="0"/>
+              <a:rPr lang="ru-RU"/>
               <a:t>Второй уровень</a:t>
             </a:r>
           </a:p>
           <a:p>
             <a:pPr lvl="2"/>
             <a:r>
-              <a:rPr lang="ru-RU" smtClean="0"/>
+              <a:rPr lang="ru-RU"/>
               <a:t>Третий уровень</a:t>
             </a:r>
           </a:p>
           <a:p>
             <a:pPr lvl="3"/>
             <a:r>
-              <a:rPr lang="ru-RU" smtClean="0"/>
+              <a:rPr lang="ru-RU"/>
               <a:t>Четвертый уровень</a:t>
             </a:r>
           </a:p>
           <a:p>
             <a:pPr lvl="4"/>
             <a:r>
-              <a:rPr lang="ru-RU" smtClean="0"/>
+              <a:rPr lang="ru-RU"/>
               <a:t>Пятый уровень</a:t>
             </a:r>
-            <a:endParaRPr lang="ru-RU"/>
           </a:p>
         </p:txBody>
       </p:sp>
@@ -454,7 +450,7 @@
           <a:p>
             <a:fld id="{48125BA4-6E50-49C4-993D-62049450E39B}" type="datetimeFigureOut">
               <a:rPr lang="ru-RU" smtClean="0"/>
-              <a:t>18.04.2022</a:t>
+              <a:t>25.04.2022</a:t>
             </a:fld>
             <a:endParaRPr lang="ru-RU"/>
           </a:p>
@@ -553,10 +549,9 @@
           <a:lstStyle/>
           <a:p>
             <a:r>
-              <a:rPr lang="ru-RU" smtClean="0"/>
+              <a:rPr lang="ru-RU"/>
               <a:t>Образец заголовка</a:t>
             </a:r>
-            <a:endParaRPr lang="ru-RU"/>
           </a:p>
         </p:txBody>
       </p:sp>
@@ -582,38 +577,37 @@
           <a:p>
             <a:pPr lvl="0"/>
             <a:r>
-              <a:rPr lang="ru-RU" smtClean="0"/>
+              <a:rPr lang="ru-RU"/>
               <a:t>Образец текста</a:t>
             </a:r>
           </a:p>
           <a:p>
             <a:pPr lvl="1"/>
             <a:r>
-              <a:rPr lang="ru-RU" smtClean="0"/>
+              <a:rPr lang="ru-RU"/>
               <a:t>Второй уровень</a:t>
             </a:r>
           </a:p>
           <a:p>
             <a:pPr lvl="2"/>
             <a:r>
-              <a:rPr lang="ru-RU" smtClean="0"/>
+              <a:rPr lang="ru-RU"/>
               <a:t>Третий уровень</a:t>
             </a:r>
           </a:p>
           <a:p>
             <a:pPr lvl="3"/>
             <a:r>
-              <a:rPr lang="ru-RU" smtClean="0"/>
+              <a:rPr lang="ru-RU"/>
               <a:t>Четвертый уровень</a:t>
             </a:r>
           </a:p>
           <a:p>
             <a:pPr lvl="4"/>
             <a:r>
-              <a:rPr lang="ru-RU" smtClean="0"/>
+              <a:rPr lang="ru-RU"/>
               <a:t>Пятый уровень</a:t>
             </a:r>
-            <a:endParaRPr lang="ru-RU"/>
           </a:p>
         </p:txBody>
       </p:sp>
@@ -634,7 +628,7 @@
           <a:p>
             <a:fld id="{48125BA4-6E50-49C4-993D-62049450E39B}" type="datetimeFigureOut">
               <a:rPr lang="ru-RU" smtClean="0"/>
-              <a:t>18.04.2022</a:t>
+              <a:t>25.04.2022</a:t>
             </a:fld>
             <a:endParaRPr lang="ru-RU"/>
           </a:p>
@@ -728,10 +722,9 @@
           <a:lstStyle/>
           <a:p>
             <a:r>
-              <a:rPr lang="ru-RU" smtClean="0"/>
+              <a:rPr lang="ru-RU"/>
               <a:t>Образец заголовка</a:t>
             </a:r>
-            <a:endParaRPr lang="ru-RU"/>
           </a:p>
         </p:txBody>
       </p:sp>
@@ -752,38 +745,37 @@
           <a:p>
             <a:pPr lvl="0"/>
             <a:r>
-              <a:rPr lang="ru-RU" smtClean="0"/>
+              <a:rPr lang="ru-RU"/>
               <a:t>Образец текста</a:t>
             </a:r>
           </a:p>
           <a:p>
             <a:pPr lvl="1"/>
             <a:r>
-              <a:rPr lang="ru-RU" smtClean="0"/>
+              <a:rPr lang="ru-RU"/>
               <a:t>Второй уровень</a:t>
             </a:r>
           </a:p>
           <a:p>
             <a:pPr lvl="2"/>
             <a:r>
-              <a:rPr lang="ru-RU" smtClean="0"/>
+              <a:rPr lang="ru-RU"/>
               <a:t>Третий уровень</a:t>
             </a:r>
           </a:p>
           <a:p>
             <a:pPr lvl="3"/>
             <a:r>
-              <a:rPr lang="ru-RU" smtClean="0"/>
+              <a:rPr lang="ru-RU"/>
               <a:t>Четвертый уровень</a:t>
             </a:r>
           </a:p>
           <a:p>
             <a:pPr lvl="4"/>
             <a:r>
-              <a:rPr lang="ru-RU" smtClean="0"/>
+              <a:rPr lang="ru-RU"/>
               <a:t>Пятый уровень</a:t>
             </a:r>
-            <a:endParaRPr lang="ru-RU"/>
           </a:p>
         </p:txBody>
       </p:sp>
@@ -804,7 +796,7 @@
           <a:p>
             <a:fld id="{48125BA4-6E50-49C4-993D-62049450E39B}" type="datetimeFigureOut">
               <a:rPr lang="ru-RU" smtClean="0"/>
-              <a:t>18.04.2022</a:t>
+              <a:t>25.04.2022</a:t>
             </a:fld>
             <a:endParaRPr lang="ru-RU"/>
           </a:p>
@@ -907,10 +899,9 @@
           </a:lstStyle>
           <a:p>
             <a:r>
-              <a:rPr lang="ru-RU" smtClean="0"/>
+              <a:rPr lang="ru-RU"/>
               <a:t>Образец заголовка</a:t>
             </a:r>
-            <a:endParaRPr lang="ru-RU"/>
           </a:p>
         </p:txBody>
       </p:sp>
@@ -1027,7 +1018,7 @@
           <a:p>
             <a:pPr lvl="0"/>
             <a:r>
-              <a:rPr lang="ru-RU" smtClean="0"/>
+              <a:rPr lang="ru-RU"/>
               <a:t>Образец текста</a:t>
             </a:r>
           </a:p>
@@ -1050,7 +1041,7 @@
           <a:p>
             <a:fld id="{48125BA4-6E50-49C4-993D-62049450E39B}" type="datetimeFigureOut">
               <a:rPr lang="ru-RU" smtClean="0"/>
-              <a:t>18.04.2022</a:t>
+              <a:t>25.04.2022</a:t>
             </a:fld>
             <a:endParaRPr lang="ru-RU"/>
           </a:p>
@@ -1144,10 +1135,9 @@
           <a:lstStyle/>
           <a:p>
             <a:r>
-              <a:rPr lang="ru-RU" smtClean="0"/>
+              <a:rPr lang="ru-RU"/>
               <a:t>Образец заголовка</a:t>
             </a:r>
-            <a:endParaRPr lang="ru-RU"/>
           </a:p>
         </p:txBody>
       </p:sp>
@@ -1173,38 +1163,37 @@
           <a:p>
             <a:pPr lvl="0"/>
             <a:r>
-              <a:rPr lang="ru-RU" smtClean="0"/>
+              <a:rPr lang="ru-RU"/>
               <a:t>Образец текста</a:t>
             </a:r>
           </a:p>
           <a:p>
             <a:pPr lvl="1"/>
             <a:r>
-              <a:rPr lang="ru-RU" smtClean="0"/>
+              <a:rPr lang="ru-RU"/>
               <a:t>Второй уровень</a:t>
             </a:r>
           </a:p>
           <a:p>
             <a:pPr lvl="2"/>
             <a:r>
-              <a:rPr lang="ru-RU" smtClean="0"/>
+              <a:rPr lang="ru-RU"/>
               <a:t>Третий уровень</a:t>
             </a:r>
           </a:p>
           <a:p>
             <a:pPr lvl="3"/>
             <a:r>
-              <a:rPr lang="ru-RU" smtClean="0"/>
+              <a:rPr lang="ru-RU"/>
               <a:t>Четвертый уровень</a:t>
             </a:r>
           </a:p>
           <a:p>
             <a:pPr lvl="4"/>
             <a:r>
-              <a:rPr lang="ru-RU" smtClean="0"/>
+              <a:rPr lang="ru-RU"/>
               <a:t>Пятый уровень</a:t>
             </a:r>
-            <a:endParaRPr lang="ru-RU"/>
           </a:p>
         </p:txBody>
       </p:sp>
@@ -1230,38 +1219,37 @@
           <a:p>
             <a:pPr lvl="0"/>
             <a:r>
-              <a:rPr lang="ru-RU" smtClean="0"/>
+              <a:rPr lang="ru-RU"/>
               <a:t>Образец текста</a:t>
             </a:r>
           </a:p>
           <a:p>
             <a:pPr lvl="1"/>
             <a:r>
-              <a:rPr lang="ru-RU" smtClean="0"/>
+              <a:rPr lang="ru-RU"/>
               <a:t>Второй уровень</a:t>
             </a:r>
           </a:p>
           <a:p>
             <a:pPr lvl="2"/>
             <a:r>
-              <a:rPr lang="ru-RU" smtClean="0"/>
+              <a:rPr lang="ru-RU"/>
               <a:t>Третий уровень</a:t>
             </a:r>
           </a:p>
           <a:p>
             <a:pPr lvl="3"/>
             <a:r>
-              <a:rPr lang="ru-RU" smtClean="0"/>
+              <a:rPr lang="ru-RU"/>
               <a:t>Четвертый уровень</a:t>
             </a:r>
           </a:p>
           <a:p>
             <a:pPr lvl="4"/>
             <a:r>
-              <a:rPr lang="ru-RU" smtClean="0"/>
+              <a:rPr lang="ru-RU"/>
               <a:t>Пятый уровень</a:t>
             </a:r>
-            <a:endParaRPr lang="ru-RU"/>
           </a:p>
         </p:txBody>
       </p:sp>
@@ -1282,7 +1270,7 @@
           <a:p>
             <a:fld id="{48125BA4-6E50-49C4-993D-62049450E39B}" type="datetimeFigureOut">
               <a:rPr lang="ru-RU" smtClean="0"/>
-              <a:t>18.04.2022</a:t>
+              <a:t>25.04.2022</a:t>
             </a:fld>
             <a:endParaRPr lang="ru-RU"/>
           </a:p>
@@ -1381,10 +1369,9 @@
           <a:lstStyle/>
           <a:p>
             <a:r>
-              <a:rPr lang="ru-RU" smtClean="0"/>
+              <a:rPr lang="ru-RU"/>
               <a:t>Образец заголовка</a:t>
             </a:r>
-            <a:endParaRPr lang="ru-RU"/>
           </a:p>
         </p:txBody>
       </p:sp>
@@ -1447,7 +1434,7 @@
           <a:p>
             <a:pPr lvl="0"/>
             <a:r>
-              <a:rPr lang="ru-RU" smtClean="0"/>
+              <a:rPr lang="ru-RU"/>
               <a:t>Образец текста</a:t>
             </a:r>
           </a:p>
@@ -1475,38 +1462,37 @@
           <a:p>
             <a:pPr lvl="0"/>
             <a:r>
-              <a:rPr lang="ru-RU" smtClean="0"/>
+              <a:rPr lang="ru-RU"/>
               <a:t>Образец текста</a:t>
             </a:r>
           </a:p>
           <a:p>
             <a:pPr lvl="1"/>
             <a:r>
-              <a:rPr lang="ru-RU" smtClean="0"/>
+              <a:rPr lang="ru-RU"/>
               <a:t>Второй уровень</a:t>
             </a:r>
           </a:p>
           <a:p>
             <a:pPr lvl="2"/>
             <a:r>
-              <a:rPr lang="ru-RU" smtClean="0"/>
+              <a:rPr lang="ru-RU"/>
               <a:t>Третий уровень</a:t>
             </a:r>
           </a:p>
           <a:p>
             <a:pPr lvl="3"/>
             <a:r>
-              <a:rPr lang="ru-RU" smtClean="0"/>
+              <a:rPr lang="ru-RU"/>
               <a:t>Четвертый уровень</a:t>
             </a:r>
           </a:p>
           <a:p>
             <a:pPr lvl="4"/>
             <a:r>
-              <a:rPr lang="ru-RU" smtClean="0"/>
+              <a:rPr lang="ru-RU"/>
               <a:t>Пятый уровень</a:t>
             </a:r>
-            <a:endParaRPr lang="ru-RU"/>
           </a:p>
         </p:txBody>
       </p:sp>
@@ -1569,7 +1555,7 @@
           <a:p>
             <a:pPr lvl="0"/>
             <a:r>
-              <a:rPr lang="ru-RU" smtClean="0"/>
+              <a:rPr lang="ru-RU"/>
               <a:t>Образец текста</a:t>
             </a:r>
           </a:p>
@@ -1597,38 +1583,37 @@
           <a:p>
             <a:pPr lvl="0"/>
             <a:r>
-              <a:rPr lang="ru-RU" smtClean="0"/>
+              <a:rPr lang="ru-RU"/>
               <a:t>Образец текста</a:t>
             </a:r>
           </a:p>
           <a:p>
             <a:pPr lvl="1"/>
             <a:r>
-              <a:rPr lang="ru-RU" smtClean="0"/>
+              <a:rPr lang="ru-RU"/>
               <a:t>Второй уровень</a:t>
             </a:r>
           </a:p>
           <a:p>
             <a:pPr lvl="2"/>
             <a:r>
-              <a:rPr lang="ru-RU" smtClean="0"/>
+              <a:rPr lang="ru-RU"/>
               <a:t>Третий уровень</a:t>
             </a:r>
           </a:p>
           <a:p>
             <a:pPr lvl="3"/>
             <a:r>
-              <a:rPr lang="ru-RU" smtClean="0"/>
+              <a:rPr lang="ru-RU"/>
               <a:t>Четвертый уровень</a:t>
             </a:r>
           </a:p>
           <a:p>
             <a:pPr lvl="4"/>
             <a:r>
-              <a:rPr lang="ru-RU" smtClean="0"/>
+              <a:rPr lang="ru-RU"/>
               <a:t>Пятый уровень</a:t>
             </a:r>
-            <a:endParaRPr lang="ru-RU"/>
           </a:p>
         </p:txBody>
       </p:sp>
@@ -1649,7 +1634,7 @@
           <a:p>
             <a:fld id="{48125BA4-6E50-49C4-993D-62049450E39B}" type="datetimeFigureOut">
               <a:rPr lang="ru-RU" smtClean="0"/>
-              <a:t>18.04.2022</a:t>
+              <a:t>25.04.2022</a:t>
             </a:fld>
             <a:endParaRPr lang="ru-RU"/>
           </a:p>
@@ -1743,10 +1728,9 @@
           <a:lstStyle/>
           <a:p>
             <a:r>
-              <a:rPr lang="ru-RU" smtClean="0"/>
+              <a:rPr lang="ru-RU"/>
               <a:t>Образец заголовка</a:t>
             </a:r>
-            <a:endParaRPr lang="ru-RU"/>
           </a:p>
         </p:txBody>
       </p:sp>
@@ -1767,7 +1751,7 @@
           <a:p>
             <a:fld id="{48125BA4-6E50-49C4-993D-62049450E39B}" type="datetimeFigureOut">
               <a:rPr lang="ru-RU" smtClean="0"/>
-              <a:t>18.04.2022</a:t>
+              <a:t>25.04.2022</a:t>
             </a:fld>
             <a:endParaRPr lang="ru-RU"/>
           </a:p>
@@ -1862,7 +1846,7 @@
           <a:p>
             <a:fld id="{48125BA4-6E50-49C4-993D-62049450E39B}" type="datetimeFigureOut">
               <a:rPr lang="ru-RU" smtClean="0"/>
-              <a:t>18.04.2022</a:t>
+              <a:t>25.04.2022</a:t>
             </a:fld>
             <a:endParaRPr lang="ru-RU"/>
           </a:p>
@@ -1965,10 +1949,9 @@
           </a:lstStyle>
           <a:p>
             <a:r>
-              <a:rPr lang="ru-RU" smtClean="0"/>
+              <a:rPr lang="ru-RU"/>
               <a:t>Образец заголовка</a:t>
             </a:r>
-            <a:endParaRPr lang="ru-RU"/>
           </a:p>
         </p:txBody>
       </p:sp>
@@ -2022,38 +2005,37 @@
           <a:p>
             <a:pPr lvl="0"/>
             <a:r>
-              <a:rPr lang="ru-RU" smtClean="0"/>
+              <a:rPr lang="ru-RU"/>
               <a:t>Образец текста</a:t>
             </a:r>
           </a:p>
           <a:p>
             <a:pPr lvl="1"/>
             <a:r>
-              <a:rPr lang="ru-RU" smtClean="0"/>
+              <a:rPr lang="ru-RU"/>
               <a:t>Второй уровень</a:t>
             </a:r>
           </a:p>
           <a:p>
             <a:pPr lvl="2"/>
             <a:r>
-              <a:rPr lang="ru-RU" smtClean="0"/>
+              <a:rPr lang="ru-RU"/>
               <a:t>Третий уровень</a:t>
             </a:r>
           </a:p>
           <a:p>
             <a:pPr lvl="3"/>
             <a:r>
-              <a:rPr lang="ru-RU" smtClean="0"/>
+              <a:rPr lang="ru-RU"/>
               <a:t>Четвертый уровень</a:t>
             </a:r>
           </a:p>
           <a:p>
             <a:pPr lvl="4"/>
             <a:r>
-              <a:rPr lang="ru-RU" smtClean="0"/>
+              <a:rPr lang="ru-RU"/>
               <a:t>Пятый уровень</a:t>
             </a:r>
-            <a:endParaRPr lang="ru-RU"/>
           </a:p>
         </p:txBody>
       </p:sp>
@@ -2116,7 +2098,7 @@
           <a:p>
             <a:pPr lvl="0"/>
             <a:r>
-              <a:rPr lang="ru-RU" smtClean="0"/>
+              <a:rPr lang="ru-RU"/>
               <a:t>Образец текста</a:t>
             </a:r>
           </a:p>
@@ -2139,7 +2121,7 @@
           <a:p>
             <a:fld id="{48125BA4-6E50-49C4-993D-62049450E39B}" type="datetimeFigureOut">
               <a:rPr lang="ru-RU" smtClean="0"/>
-              <a:t>18.04.2022</a:t>
+              <a:t>25.04.2022</a:t>
             </a:fld>
             <a:endParaRPr lang="ru-RU"/>
           </a:p>
@@ -2242,10 +2224,9 @@
           </a:lstStyle>
           <a:p>
             <a:r>
-              <a:rPr lang="ru-RU" smtClean="0"/>
+              <a:rPr lang="ru-RU"/>
               <a:t>Образец заголовка</a:t>
             </a:r>
-            <a:endParaRPr lang="ru-RU"/>
           </a:p>
         </p:txBody>
       </p:sp>
@@ -2369,7 +2350,7 @@
           <a:p>
             <a:pPr lvl="0"/>
             <a:r>
-              <a:rPr lang="ru-RU" smtClean="0"/>
+              <a:rPr lang="ru-RU"/>
               <a:t>Образец текста</a:t>
             </a:r>
           </a:p>
@@ -2392,7 +2373,7 @@
           <a:p>
             <a:fld id="{48125BA4-6E50-49C4-993D-62049450E39B}" type="datetimeFigureOut">
               <a:rPr lang="ru-RU" smtClean="0"/>
-              <a:t>18.04.2022</a:t>
+              <a:t>25.04.2022</a:t>
             </a:fld>
             <a:endParaRPr lang="ru-RU"/>
           </a:p>
@@ -2511,10 +2492,9 @@
           <a:lstStyle/>
           <a:p>
             <a:r>
-              <a:rPr lang="ru-RU" smtClean="0"/>
+              <a:rPr lang="ru-RU"/>
               <a:t>Образец заголовка</a:t>
             </a:r>
-            <a:endParaRPr lang="ru-RU"/>
           </a:p>
         </p:txBody>
       </p:sp>
@@ -2545,38 +2525,37 @@
           <a:p>
             <a:pPr lvl="0"/>
             <a:r>
-              <a:rPr lang="ru-RU" smtClean="0"/>
+              <a:rPr lang="ru-RU"/>
               <a:t>Образец текста</a:t>
             </a:r>
           </a:p>
           <a:p>
             <a:pPr lvl="1"/>
             <a:r>
-              <a:rPr lang="ru-RU" smtClean="0"/>
+              <a:rPr lang="ru-RU"/>
               <a:t>Второй уровень</a:t>
             </a:r>
           </a:p>
           <a:p>
             <a:pPr lvl="2"/>
             <a:r>
-              <a:rPr lang="ru-RU" smtClean="0"/>
+              <a:rPr lang="ru-RU"/>
               <a:t>Третий уровень</a:t>
             </a:r>
           </a:p>
           <a:p>
             <a:pPr lvl="3"/>
             <a:r>
-              <a:rPr lang="ru-RU" smtClean="0"/>
+              <a:rPr lang="ru-RU"/>
               <a:t>Четвертый уровень</a:t>
             </a:r>
           </a:p>
           <a:p>
             <a:pPr lvl="4"/>
             <a:r>
-              <a:rPr lang="ru-RU" smtClean="0"/>
+              <a:rPr lang="ru-RU"/>
               <a:t>Пятый уровень</a:t>
             </a:r>
-            <a:endParaRPr lang="ru-RU"/>
           </a:p>
         </p:txBody>
       </p:sp>
@@ -2615,7 +2594,7 @@
           <a:p>
             <a:fld id="{48125BA4-6E50-49C4-993D-62049450E39B}" type="datetimeFigureOut">
               <a:rPr lang="ru-RU" smtClean="0"/>
-              <a:t>18.04.2022</a:t>
+              <a:t>25.04.2022</a:t>
             </a:fld>
             <a:endParaRPr lang="ru-RU"/>
           </a:p>
@@ -3064,16 +3043,10 @@
           <a:lstStyle/>
           <a:p>
             <a:r>
-              <a:rPr lang="ru-RU" b="1" dirty="0" smtClean="0">
+              <a:rPr lang="ru-RU" b="1" dirty="0">
                 <a:latin typeface="Bahnschrift Condensed" panose="020B0502040204020203" pitchFamily="34" charset="0"/>
               </a:rPr>
               <a:t>Сайт</a:t>
-            </a:r>
-            <a:r>
-              <a:rPr lang="ru-RU" b="1" dirty="0">
-                <a:latin typeface="Bahnschrift Condensed" panose="020B0502040204020203" pitchFamily="34" charset="0"/>
-              </a:rPr>
-              <a:t/>
             </a:r>
             <a:br>
               <a:rPr lang="ru-RU" b="1" dirty="0">
@@ -3081,26 +3054,23 @@
               </a:rPr>
             </a:br>
             <a:r>
-              <a:rPr lang="ru-RU" b="1" dirty="0" smtClean="0">
+              <a:rPr lang="ru-RU" b="1" dirty="0">
                 <a:latin typeface="Bahnschrift Condensed" panose="020B0502040204020203" pitchFamily="34" charset="0"/>
               </a:rPr>
               <a:t>«Контроллер сохранений </a:t>
             </a:r>
             <a:r>
-              <a:rPr lang="en-US" b="1" dirty="0" smtClean="0">
+              <a:rPr lang="en-US" b="1" dirty="0">
                 <a:latin typeface="Bahnschrift Condensed" panose="020B0502040204020203" pitchFamily="34" charset="0"/>
               </a:rPr>
               <a:t>Satisfactory</a:t>
             </a:r>
             <a:r>
-              <a:rPr lang="ru-RU" b="1" dirty="0" smtClean="0">
+              <a:rPr lang="ru-RU" b="1" dirty="0">
                 <a:latin typeface="Bahnschrift Condensed" panose="020B0502040204020203" pitchFamily="34" charset="0"/>
               </a:rPr>
               <a:t>»</a:t>
             </a:r>
-            <a:endParaRPr lang="ru-RU" b="1" dirty="0">
-              <a:latin typeface="Bahnschrift Condensed" panose="020B0502040204020203" pitchFamily="34" charset="0"/>
-            </a:endParaRPr>
           </a:p>
         </p:txBody>
       </p:sp>
@@ -3146,17 +3116,8 @@
               <a:rPr lang="ru-RU" b="1" dirty="0">
                 <a:latin typeface="Bahnschrift Condensed" panose="020B0502040204020203" pitchFamily="34" charset="0"/>
               </a:rPr>
-              <a:t> </a:t>
+              <a:t> Владислав</a:t>
             </a:r>
-            <a:r>
-              <a:rPr lang="ru-RU" b="1" dirty="0" smtClean="0">
-                <a:latin typeface="Bahnschrift Condensed" panose="020B0502040204020203" pitchFamily="34" charset="0"/>
-              </a:rPr>
-              <a:t>Владислав</a:t>
-            </a:r>
-            <a:endParaRPr lang="ru-RU" b="1" dirty="0">
-              <a:latin typeface="Bahnschrift Condensed" panose="020B0502040204020203" pitchFamily="34" charset="0"/>
-            </a:endParaRPr>
           </a:p>
         </p:txBody>
       </p:sp>
@@ -3211,29 +3172,20 @@
               <a:rPr lang="ru-RU" sz="4000" b="1" dirty="0">
                 <a:latin typeface="Bahnschrift Condensed" panose="020B0502040204020203" pitchFamily="34" charset="0"/>
               </a:rPr>
-              <a:t>Проектная работа по модулю </a:t>
+              <a:t>Проектная работа по модулю «</a:t>
             </a:r>
             <a:r>
-              <a:rPr lang="ru-RU" sz="4000" b="1" dirty="0" smtClean="0">
-                <a:latin typeface="Bahnschrift Condensed" panose="020B0502040204020203" pitchFamily="34" charset="0"/>
-              </a:rPr>
-              <a:t>«</a:t>
-            </a:r>
-            <a:r>
-              <a:rPr lang="en-US" sz="4000" b="1" dirty="0" smtClean="0">
+              <a:rPr lang="en-US" sz="4000" b="1" dirty="0">
                 <a:latin typeface="Bahnschrift Condensed" panose="020B0502040204020203" pitchFamily="34" charset="0"/>
               </a:rPr>
               <a:t>WEB</a:t>
             </a:r>
             <a:r>
-              <a:rPr lang="ru-RU" sz="4000" b="1" dirty="0" smtClean="0">
+              <a:rPr lang="ru-RU" sz="4000" b="1" dirty="0">
                 <a:latin typeface="Bahnschrift Condensed" panose="020B0502040204020203" pitchFamily="34" charset="0"/>
               </a:rPr>
               <a:t>»</a:t>
             </a:r>
-            <a:endParaRPr lang="ru-RU" sz="4000" b="1" dirty="0">
-              <a:latin typeface="Bahnschrift Condensed" panose="020B0502040204020203" pitchFamily="34" charset="0"/>
-            </a:endParaRPr>
           </a:p>
         </p:txBody>
       </p:sp>
@@ -3247,13 +3199,6 @@
   <p:clrMapOvr>
     <a:masterClrMapping/>
   </p:clrMapOvr>
-  <p:timing>
-    <p:tnLst>
-      <p:par>
-        <p:cTn id="1" dur="indefinite" restart="never" nodeType="tmRoot"/>
-      </p:par>
-    </p:tnLst>
-  </p:timing>
 </p:sld>
 </file>
 
@@ -3322,14 +3267,11 @@
           </a:lstStyle>
           <a:p>
             <a:r>
-              <a:rPr lang="ru-RU" sz="6023" b="1" dirty="0" smtClean="0">
+              <a:rPr lang="ru-RU" sz="6023" b="1" dirty="0">
                 <a:latin typeface="Bahnschrift Condensed" panose="020B0502040204020203" pitchFamily="34" charset="0"/>
               </a:rPr>
               <a:t>Бот и сайт как единая программа</a:t>
             </a:r>
-            <a:endParaRPr lang="ru-RU" sz="6023" b="1" dirty="0">
-              <a:latin typeface="Bahnschrift Condensed" panose="020B0502040204020203" pitchFamily="34" charset="0"/>
-            </a:endParaRPr>
           </a:p>
         </p:txBody>
       </p:sp>
@@ -3365,7 +3307,7 @@
           <a:lstStyle/>
           <a:p>
             <a:r>
-              <a:rPr lang="en-US" sz="3600" dirty="0" smtClean="0"/>
+              <a:rPr lang="en-US" sz="3600" dirty="0"/>
               <a:t>Thread</a:t>
             </a:r>
             <a:endParaRPr lang="ru-RU" sz="3600" dirty="0"/>
@@ -3404,7 +3346,7 @@
           <a:lstStyle/>
           <a:p>
             <a:r>
-              <a:rPr lang="en-US" sz="3600" dirty="0" smtClean="0"/>
+              <a:rPr lang="en-US" sz="3600" dirty="0"/>
               <a:t>Site</a:t>
             </a:r>
             <a:endParaRPr lang="ru-RU" sz="3600" dirty="0"/>
@@ -3482,7 +3424,7 @@
           <a:lstStyle/>
           <a:p>
             <a:r>
-              <a:rPr lang="en-US" sz="3600" dirty="0" smtClean="0"/>
+              <a:rPr lang="en-US" sz="3600" dirty="0"/>
               <a:t>Threading</a:t>
             </a:r>
             <a:endParaRPr lang="ru-RU" sz="3600" dirty="0"/>
@@ -3599,7 +3541,7 @@
           <a:lstStyle/>
           <a:p>
             <a:r>
-              <a:rPr lang="en-US" sz="3600" dirty="0" err="1" smtClean="0"/>
+              <a:rPr lang="en-US" sz="3600" dirty="0" err="1"/>
               <a:t>Asyncio</a:t>
             </a:r>
             <a:endParaRPr lang="ru-RU" sz="3600" dirty="0"/>
@@ -3638,7 +3580,7 @@
           <a:lstStyle/>
           <a:p>
             <a:r>
-              <a:rPr lang="en-US" sz="3600" dirty="0" smtClean="0"/>
+              <a:rPr lang="en-US" sz="3600" dirty="0"/>
               <a:t>Discord bot</a:t>
             </a:r>
             <a:endParaRPr lang="ru-RU" sz="3600" dirty="0"/>
@@ -3677,10 +3619,9 @@
           <a:lstStyle/>
           <a:p>
             <a:r>
-              <a:rPr lang="ru-RU" sz="3600" dirty="0" smtClean="0"/>
+              <a:rPr lang="ru-RU" sz="3600" dirty="0"/>
               <a:t>Запуск</a:t>
             </a:r>
-            <a:endParaRPr lang="ru-RU" sz="3600" dirty="0"/>
           </a:p>
         </p:txBody>
       </p:sp>
@@ -3716,10 +3657,9 @@
           <a:lstStyle/>
           <a:p>
             <a:r>
-              <a:rPr lang="ru-RU" sz="3600" dirty="0" smtClean="0"/>
+              <a:rPr lang="ru-RU" sz="3600" dirty="0"/>
               <a:t>1</a:t>
             </a:r>
-            <a:endParaRPr lang="ru-RU" sz="3600" dirty="0"/>
           </a:p>
         </p:txBody>
       </p:sp>
@@ -3833,10 +3773,9 @@
           <a:lstStyle/>
           <a:p>
             <a:r>
-              <a:rPr lang="ru-RU" sz="3600" dirty="0" smtClean="0"/>
+              <a:rPr lang="ru-RU" sz="3600" dirty="0"/>
               <a:t>2</a:t>
             </a:r>
-            <a:endParaRPr lang="ru-RU" sz="3600" dirty="0"/>
           </a:p>
         </p:txBody>
       </p:sp>
@@ -3988,7 +3927,7 @@
                             </p:stCondLst>
                             <p:childTnLst>
                               <p:par>
-                                <p:cTn id="5" presetID="10" presetClass="entr" presetSubtype="0" fill="hold" grpId="0" nodeType="clickEffect">
+                                <p:cTn id="5" presetID="22" presetClass="entr" presetSubtype="4" fill="hold" grpId="0" nodeType="clickEffect">
                                   <p:stCondLst>
                                     <p:cond delay="0"/>
                                   </p:stCondLst>
@@ -4001,7 +3940,7 @@
                                           </p:stCondLst>
                                         </p:cTn>
                                         <p:tgtEl>
-                                          <p:spTgt spid="39"/>
+                                          <p:spTgt spid="120"/>
                                         </p:tgtEl>
                                         <p:attrNameLst>
                                           <p:attrName>style.visibility</p:attrName>
@@ -4011,11 +3950,151 @@
                                         <p:strVal val="visible"/>
                                       </p:to>
                                     </p:set>
-                                    <p:animEffect transition="in" filter="fade">
+                                    <p:animEffect transition="in" filter="wipe(down)">
                                       <p:cBhvr>
                                         <p:cTn id="7" dur="500"/>
                                         <p:tgtEl>
-                                          <p:spTgt spid="39"/>
+                                          <p:spTgt spid="120"/>
+                                        </p:tgtEl>
+                                      </p:cBhvr>
+                                    </p:animEffect>
+                                  </p:childTnLst>
+                                </p:cTn>
+                              </p:par>
+                              <p:par>
+                                <p:cTn id="8" presetID="22" presetClass="entr" presetSubtype="4" fill="hold" grpId="0" nodeType="withEffect">
+                                  <p:stCondLst>
+                                    <p:cond delay="0"/>
+                                  </p:stCondLst>
+                                  <p:childTnLst>
+                                    <p:set>
+                                      <p:cBhvr>
+                                        <p:cTn id="9" dur="1" fill="hold">
+                                          <p:stCondLst>
+                                            <p:cond delay="0"/>
+                                          </p:stCondLst>
+                                        </p:cTn>
+                                        <p:tgtEl>
+                                          <p:spTgt spid="121"/>
+                                        </p:tgtEl>
+                                        <p:attrNameLst>
+                                          <p:attrName>style.visibility</p:attrName>
+                                        </p:attrNameLst>
+                                      </p:cBhvr>
+                                      <p:to>
+                                        <p:strVal val="visible"/>
+                                      </p:to>
+                                    </p:set>
+                                    <p:animEffect transition="in" filter="wipe(down)">
+                                      <p:cBhvr>
+                                        <p:cTn id="10" dur="500"/>
+                                        <p:tgtEl>
+                                          <p:spTgt spid="121"/>
+                                        </p:tgtEl>
+                                      </p:cBhvr>
+                                    </p:animEffect>
+                                  </p:childTnLst>
+                                </p:cTn>
+                              </p:par>
+                              <p:par>
+                                <p:cTn id="11" presetID="22" presetClass="entr" presetSubtype="4" fill="hold" grpId="0" nodeType="withEffect">
+                                  <p:stCondLst>
+                                    <p:cond delay="0"/>
+                                  </p:stCondLst>
+                                  <p:childTnLst>
+                                    <p:set>
+                                      <p:cBhvr>
+                                        <p:cTn id="12" dur="1" fill="hold">
+                                          <p:stCondLst>
+                                            <p:cond delay="0"/>
+                                          </p:stCondLst>
+                                        </p:cTn>
+                                        <p:tgtEl>
+                                          <p:spTgt spid="139"/>
+                                        </p:tgtEl>
+                                        <p:attrNameLst>
+                                          <p:attrName>style.visibility</p:attrName>
+                                        </p:attrNameLst>
+                                      </p:cBhvr>
+                                      <p:to>
+                                        <p:strVal val="visible"/>
+                                      </p:to>
+                                    </p:set>
+                                    <p:animEffect transition="in" filter="wipe(down)">
+                                      <p:cBhvr>
+                                        <p:cTn id="13" dur="500"/>
+                                        <p:tgtEl>
+                                          <p:spTgt spid="139"/>
+                                        </p:tgtEl>
+                                      </p:cBhvr>
+                                    </p:animEffect>
+                                  </p:childTnLst>
+                                </p:cTn>
+                              </p:par>
+                              <p:par>
+                                <p:cTn id="14" presetID="22" presetClass="entr" presetSubtype="4" fill="hold" nodeType="withEffect">
+                                  <p:stCondLst>
+                                    <p:cond delay="0"/>
+                                  </p:stCondLst>
+                                  <p:childTnLst>
+                                    <p:set>
+                                      <p:cBhvr>
+                                        <p:cTn id="15" dur="1" fill="hold">
+                                          <p:stCondLst>
+                                            <p:cond delay="0"/>
+                                          </p:stCondLst>
+                                        </p:cTn>
+                                        <p:tgtEl>
+                                          <p:spTgt spid="130"/>
+                                        </p:tgtEl>
+                                        <p:attrNameLst>
+                                          <p:attrName>style.visibility</p:attrName>
+                                        </p:attrNameLst>
+                                      </p:cBhvr>
+                                      <p:to>
+                                        <p:strVal val="visible"/>
+                                      </p:to>
+                                    </p:set>
+                                    <p:animEffect transition="in" filter="wipe(down)">
+                                      <p:cBhvr>
+                                        <p:cTn id="16" dur="500"/>
+                                        <p:tgtEl>
+                                          <p:spTgt spid="130"/>
+                                        </p:tgtEl>
+                                      </p:cBhvr>
+                                    </p:animEffect>
+                                  </p:childTnLst>
+                                </p:cTn>
+                              </p:par>
+                              <p:par>
+                                <p:cTn id="17" presetID="22" presetClass="entr" presetSubtype="4" fill="hold" nodeType="withEffect">
+                                  <p:stCondLst>
+                                    <p:cond delay="0"/>
+                                  </p:stCondLst>
+                                  <p:childTnLst>
+                                    <p:set>
+                                      <p:cBhvr>
+                                        <p:cTn id="18" dur="1" fill="hold">
+                                          <p:stCondLst>
+                                            <p:cond delay="0"/>
+                                          </p:stCondLst>
+                                        </p:cTn>
+                                        <p:tgtEl>
+                                          <p:spTgt spid="140"/>
+                                        </p:tgtEl>
+                                        <p:attrNameLst>
+                                          <p:attrName>style.visibility</p:attrName>
+                                        </p:attrNameLst>
+                                      </p:cBhvr>
+                                      <p:to>
+                                        <p:strVal val="visible"/>
+                                      </p:to>
+                                    </p:set>
+                                    <p:animEffect transition="in" filter="wipe(down)">
+                                      <p:cBhvr>
+                                        <p:cTn id="19" dur="500"/>
+                                        <p:tgtEl>
+                                          <p:spTgt spid="140"/>
                                         </p:tgtEl>
                                       </p:cBhvr>
                                     </p:animEffect>
@@ -4029,32 +4108,32 @@
                     </p:cTn>
                   </p:par>
                   <p:par>
-                    <p:cTn id="8" fill="hold">
+                    <p:cTn id="20" fill="hold">
                       <p:stCondLst>
                         <p:cond delay="indefinite"/>
                       </p:stCondLst>
                       <p:childTnLst>
                         <p:par>
-                          <p:cTn id="9" fill="hold">
+                          <p:cTn id="21" fill="hold">
                             <p:stCondLst>
                               <p:cond delay="0"/>
                             </p:stCondLst>
                             <p:childTnLst>
                               <p:par>
-                                <p:cTn id="10" presetID="10" presetClass="entr" presetSubtype="0" fill="hold" nodeType="clickEffect">
+                                <p:cTn id="22" presetID="22" presetClass="entr" presetSubtype="4" fill="hold" grpId="0" nodeType="clickEffect">
                                   <p:stCondLst>
                                     <p:cond delay="0"/>
                                   </p:stCondLst>
                                   <p:childTnLst>
                                     <p:set>
                                       <p:cBhvr>
-                                        <p:cTn id="11" dur="1" fill="hold">
+                                        <p:cTn id="23" dur="1" fill="hold">
                                           <p:stCondLst>
                                             <p:cond delay="0"/>
                                           </p:stCondLst>
                                         </p:cTn>
                                         <p:tgtEl>
-                                          <p:spTgt spid="41"/>
+                                          <p:spTgt spid="39"/>
                                         </p:tgtEl>
                                         <p:attrNameLst>
                                           <p:attrName>style.visibility</p:attrName>
@@ -4064,11 +4143,11 @@
                                         <p:strVal val="visible"/>
                                       </p:to>
                                     </p:set>
-                                    <p:animEffect transition="in" filter="fade">
-                                      <p:cBhvr>
-                                        <p:cTn id="12" dur="500"/>
-                                        <p:tgtEl>
-                                          <p:spTgt spid="41"/>
+                                    <p:animEffect transition="in" filter="wipe(down)">
+                                      <p:cBhvr>
+                                        <p:cTn id="24" dur="500"/>
+                                        <p:tgtEl>
+                                          <p:spTgt spid="39"/>
                                         </p:tgtEl>
                                       </p:cBhvr>
                                     </p:animEffect>
@@ -4076,20 +4155,20 @@
                                 </p:cTn>
                               </p:par>
                               <p:par>
-                                <p:cTn id="13" presetID="10" presetClass="entr" presetSubtype="0" fill="hold" grpId="0" nodeType="withEffect">
+                                <p:cTn id="25" presetID="22" presetClass="entr" presetSubtype="4" fill="hold" nodeType="withEffect">
                                   <p:stCondLst>
                                     <p:cond delay="0"/>
                                   </p:stCondLst>
                                   <p:childTnLst>
                                     <p:set>
                                       <p:cBhvr>
-                                        <p:cTn id="14" dur="1" fill="hold">
+                                        <p:cTn id="26" dur="1" fill="hold">
                                           <p:stCondLst>
                                             <p:cond delay="0"/>
                                           </p:stCondLst>
                                         </p:cTn>
                                         <p:tgtEl>
-                                          <p:spTgt spid="42"/>
+                                          <p:spTgt spid="40"/>
                                         </p:tgtEl>
                                         <p:attrNameLst>
                                           <p:attrName>style.visibility</p:attrName>
@@ -4099,11 +4178,11 @@
                                         <p:strVal val="visible"/>
                                       </p:to>
                                     </p:set>
-                                    <p:animEffect transition="in" filter="fade">
-                                      <p:cBhvr>
-                                        <p:cTn id="15" dur="500"/>
-                                        <p:tgtEl>
-                                          <p:spTgt spid="42"/>
+                                    <p:animEffect transition="in" filter="wipe(down)">
+                                      <p:cBhvr>
+                                        <p:cTn id="27" dur="500"/>
+                                        <p:tgtEl>
+                                          <p:spTgt spid="40"/>
                                         </p:tgtEl>
                                       </p:cBhvr>
                                     </p:animEffect>
@@ -4111,20 +4190,20 @@
                                 </p:cTn>
                               </p:par>
                               <p:par>
-                                <p:cTn id="16" presetID="10" presetClass="entr" presetSubtype="0" fill="hold" grpId="0" nodeType="withEffect">
+                                <p:cTn id="28" presetID="22" presetClass="entr" presetSubtype="4" fill="hold" nodeType="withEffect">
                                   <p:stCondLst>
                                     <p:cond delay="0"/>
                                   </p:stCondLst>
                                   <p:childTnLst>
                                     <p:set>
                                       <p:cBhvr>
-                                        <p:cTn id="17" dur="1" fill="hold">
+                                        <p:cTn id="29" dur="1" fill="hold">
                                           <p:stCondLst>
                                             <p:cond delay="0"/>
                                           </p:stCondLst>
                                         </p:cTn>
                                         <p:tgtEl>
-                                          <p:spTgt spid="45"/>
+                                          <p:spTgt spid="133"/>
                                         </p:tgtEl>
                                         <p:attrNameLst>
                                           <p:attrName>style.visibility</p:attrName>
@@ -4134,11 +4213,116 @@
                                         <p:strVal val="visible"/>
                                       </p:to>
                                     </p:set>
-                                    <p:animEffect transition="in" filter="fade">
-                                      <p:cBhvr>
-                                        <p:cTn id="18" dur="500"/>
-                                        <p:tgtEl>
-                                          <p:spTgt spid="45"/>
+                                    <p:animEffect transition="in" filter="wipe(down)">
+                                      <p:cBhvr>
+                                        <p:cTn id="30" dur="500"/>
+                                        <p:tgtEl>
+                                          <p:spTgt spid="133"/>
+                                        </p:tgtEl>
+                                      </p:cBhvr>
+                                    </p:animEffect>
+                                  </p:childTnLst>
+                                </p:cTn>
+                              </p:par>
+                              <p:par>
+                                <p:cTn id="31" presetID="22" presetClass="entr" presetSubtype="4" fill="hold" grpId="0" nodeType="withEffect">
+                                  <p:stCondLst>
+                                    <p:cond delay="0"/>
+                                  </p:stCondLst>
+                                  <p:childTnLst>
+                                    <p:set>
+                                      <p:cBhvr>
+                                        <p:cTn id="32" dur="1" fill="hold">
+                                          <p:stCondLst>
+                                            <p:cond delay="0"/>
+                                          </p:stCondLst>
+                                        </p:cTn>
+                                        <p:tgtEl>
+                                          <p:spTgt spid="30"/>
+                                        </p:tgtEl>
+                                        <p:attrNameLst>
+                                          <p:attrName>style.visibility</p:attrName>
+                                        </p:attrNameLst>
+                                      </p:cBhvr>
+                                      <p:to>
+                                        <p:strVal val="visible"/>
+                                      </p:to>
+                                    </p:set>
+                                    <p:animEffect transition="in" filter="wipe(down)">
+                                      <p:cBhvr>
+                                        <p:cTn id="33" dur="500"/>
+                                        <p:tgtEl>
+                                          <p:spTgt spid="30"/>
+                                        </p:tgtEl>
+                                      </p:cBhvr>
+                                    </p:animEffect>
+                                  </p:childTnLst>
+                                </p:cTn>
+                              </p:par>
+                              <p:par>
+                                <p:cTn id="34" presetID="22" presetClass="entr" presetSubtype="4" fill="hold" nodeType="withEffect">
+                                  <p:stCondLst>
+                                    <p:cond delay="0"/>
+                                  </p:stCondLst>
+                                  <p:childTnLst>
+                                    <p:set>
+                                      <p:cBhvr>
+                                        <p:cTn id="35" dur="1" fill="hold">
+                                          <p:stCondLst>
+                                            <p:cond delay="0"/>
+                                          </p:stCondLst>
+                                        </p:cTn>
+                                        <p:tgtEl>
+                                          <p:spTgt spid="35"/>
+                                        </p:tgtEl>
+                                        <p:attrNameLst>
+                                          <p:attrName>style.visibility</p:attrName>
+                                        </p:attrNameLst>
+                                      </p:cBhvr>
+                                      <p:to>
+                                        <p:strVal val="visible"/>
+                                      </p:to>
+                                    </p:set>
+                                    <p:animEffect transition="in" filter="wipe(down)">
+                                      <p:cBhvr>
+                                        <p:cTn id="36" dur="500"/>
+                                        <p:tgtEl>
+                                          <p:spTgt spid="35"/>
+                                        </p:tgtEl>
+                                      </p:cBhvr>
+                                    </p:animEffect>
+                                  </p:childTnLst>
+                                </p:cTn>
+                              </p:par>
+                              <p:par>
+                                <p:cTn id="37" presetID="22" presetClass="entr" presetSubtype="4" fill="hold" grpId="0" nodeType="withEffect">
+                                  <p:stCondLst>
+                                    <p:cond delay="0"/>
+                                  </p:stCondLst>
+                                  <p:childTnLst>
+                                    <p:set>
+                                      <p:cBhvr>
+                                        <p:cTn id="38" dur="1" fill="hold">
+                                          <p:stCondLst>
+                                            <p:cond delay="0"/>
+                                          </p:stCondLst>
+                                        </p:cTn>
+                                        <p:tgtEl>
+                                          <p:spTgt spid="31"/>
+                                        </p:tgtEl>
+                                        <p:attrNameLst>
+                                          <p:attrName>style.visibility</p:attrName>
+                                        </p:attrNameLst>
+                                      </p:cBhvr>
+                                      <p:to>
+                                        <p:strVal val="visible"/>
+                                      </p:to>
+                                    </p:set>
+                                    <p:animEffect transition="in" filter="wipe(down)">
+                                      <p:cBhvr>
+                                        <p:cTn id="39" dur="500"/>
+                                        <p:tgtEl>
+                                          <p:spTgt spid="31"/>
                                         </p:tgtEl>
                                       </p:cBhvr>
                                     </p:animEffect>
@@ -4152,32 +4336,32 @@
                     </p:cTn>
                   </p:par>
                   <p:par>
-                    <p:cTn id="19" fill="hold">
+                    <p:cTn id="40" fill="hold">
                       <p:stCondLst>
                         <p:cond delay="indefinite"/>
                       </p:stCondLst>
                       <p:childTnLst>
                         <p:par>
-                          <p:cTn id="20" fill="hold">
+                          <p:cTn id="41" fill="hold">
                             <p:stCondLst>
                               <p:cond delay="0"/>
                             </p:stCondLst>
                             <p:childTnLst>
                               <p:par>
-                                <p:cTn id="21" presetID="22" presetClass="entr" presetSubtype="1" fill="hold" grpId="0" nodeType="clickEffect">
+                                <p:cTn id="42" presetID="22" presetClass="entr" presetSubtype="4" fill="hold" nodeType="clickEffect">
                                   <p:stCondLst>
                                     <p:cond delay="0"/>
                                   </p:stCondLst>
                                   <p:childTnLst>
                                     <p:set>
                                       <p:cBhvr>
-                                        <p:cTn id="22" dur="1" fill="hold">
+                                        <p:cTn id="43" dur="1" fill="hold">
                                           <p:stCondLst>
                                             <p:cond delay="0"/>
                                           </p:stCondLst>
                                         </p:cTn>
                                         <p:tgtEl>
-                                          <p:spTgt spid="30"/>
+                                          <p:spTgt spid="143"/>
                                         </p:tgtEl>
                                         <p:attrNameLst>
                                           <p:attrName>style.visibility</p:attrName>
@@ -4187,11 +4371,11 @@
                                         <p:strVal val="visible"/>
                                       </p:to>
                                     </p:set>
-                                    <p:animEffect transition="in" filter="wipe(up)">
-                                      <p:cBhvr>
-                                        <p:cTn id="23" dur="500"/>
-                                        <p:tgtEl>
-                                          <p:spTgt spid="30"/>
+                                    <p:animEffect transition="in" filter="wipe(down)">
+                                      <p:cBhvr>
+                                        <p:cTn id="44" dur="500"/>
+                                        <p:tgtEl>
+                                          <p:spTgt spid="143"/>
                                         </p:tgtEl>
                                       </p:cBhvr>
                                     </p:animEffect>
@@ -4199,20 +4383,20 @@
                                 </p:cTn>
                               </p:par>
                               <p:par>
-                                <p:cTn id="24" presetID="22" presetClass="entr" presetSubtype="1" fill="hold" nodeType="withEffect">
+                                <p:cTn id="45" presetID="22" presetClass="entr" presetSubtype="4" fill="hold" grpId="0" nodeType="withEffect">
                                   <p:stCondLst>
                                     <p:cond delay="0"/>
                                   </p:stCondLst>
                                   <p:childTnLst>
                                     <p:set>
                                       <p:cBhvr>
-                                        <p:cTn id="25" dur="1" fill="hold">
+                                        <p:cTn id="46" dur="1" fill="hold">
                                           <p:stCondLst>
                                             <p:cond delay="0"/>
                                           </p:stCondLst>
                                         </p:cTn>
                                         <p:tgtEl>
-                                          <p:spTgt spid="35"/>
+                                          <p:spTgt spid="45"/>
                                         </p:tgtEl>
                                         <p:attrNameLst>
                                           <p:attrName>style.visibility</p:attrName>
@@ -4222,11 +4406,11 @@
                                         <p:strVal val="visible"/>
                                       </p:to>
                                     </p:set>
-                                    <p:animEffect transition="in" filter="wipe(up)">
-                                      <p:cBhvr>
-                                        <p:cTn id="26" dur="500"/>
-                                        <p:tgtEl>
-                                          <p:spTgt spid="35"/>
+                                    <p:animEffect transition="in" filter="wipe(down)">
+                                      <p:cBhvr>
+                                        <p:cTn id="47" dur="500"/>
+                                        <p:tgtEl>
+                                          <p:spTgt spid="45"/>
                                         </p:tgtEl>
                                       </p:cBhvr>
                                     </p:animEffect>
@@ -4234,20 +4418,20 @@
                                 </p:cTn>
                               </p:par>
                               <p:par>
-                                <p:cTn id="27" presetID="22" presetClass="entr" presetSubtype="1" fill="hold" grpId="0" nodeType="withEffect">
+                                <p:cTn id="48" presetID="22" presetClass="entr" presetSubtype="4" fill="hold" nodeType="withEffect">
                                   <p:stCondLst>
                                     <p:cond delay="0"/>
                                   </p:stCondLst>
                                   <p:childTnLst>
                                     <p:set>
                                       <p:cBhvr>
-                                        <p:cTn id="28" dur="1" fill="hold">
+                                        <p:cTn id="49" dur="1" fill="hold">
                                           <p:stCondLst>
                                             <p:cond delay="0"/>
                                           </p:stCondLst>
                                         </p:cTn>
                                         <p:tgtEl>
-                                          <p:spTgt spid="31"/>
+                                          <p:spTgt spid="165"/>
                                         </p:tgtEl>
                                         <p:attrNameLst>
                                           <p:attrName>style.visibility</p:attrName>
@@ -4257,11 +4441,11 @@
                                         <p:strVal val="visible"/>
                                       </p:to>
                                     </p:set>
-                                    <p:animEffect transition="in" filter="wipe(up)">
-                                      <p:cBhvr>
-                                        <p:cTn id="29" dur="500"/>
-                                        <p:tgtEl>
-                                          <p:spTgt spid="31"/>
+                                    <p:animEffect transition="in" filter="wipe(down)">
+                                      <p:cBhvr>
+                                        <p:cTn id="50" dur="500"/>
+                                        <p:tgtEl>
+                                          <p:spTgt spid="165"/>
                                         </p:tgtEl>
                                       </p:cBhvr>
                                     </p:animEffect>
@@ -4269,20 +4453,20 @@
                                 </p:cTn>
                               </p:par>
                               <p:par>
-                                <p:cTn id="30" presetID="10" presetClass="entr" presetSubtype="0" fill="hold" nodeType="withEffect">
+                                <p:cTn id="51" presetID="22" presetClass="entr" presetSubtype="4" fill="hold" nodeType="withEffect">
                                   <p:stCondLst>
                                     <p:cond delay="0"/>
                                   </p:stCondLst>
                                   <p:childTnLst>
                                     <p:set>
                                       <p:cBhvr>
-                                        <p:cTn id="31" dur="1" fill="hold">
+                                        <p:cTn id="52" dur="1" fill="hold">
                                           <p:stCondLst>
                                             <p:cond delay="0"/>
                                           </p:stCondLst>
                                         </p:cTn>
                                         <p:tgtEl>
-                                          <p:spTgt spid="40"/>
+                                          <p:spTgt spid="41"/>
                                         </p:tgtEl>
                                         <p:attrNameLst>
                                           <p:attrName>style.visibility</p:attrName>
@@ -4292,261 +4476,32 @@
                                         <p:strVal val="visible"/>
                                       </p:to>
                                     </p:set>
-                                    <p:animEffect transition="in" filter="fade">
-                                      <p:cBhvr>
-                                        <p:cTn id="32" dur="500"/>
-                                        <p:tgtEl>
-                                          <p:spTgt spid="40"/>
+                                    <p:animEffect transition="in" filter="wipe(down)">
+                                      <p:cBhvr>
+                                        <p:cTn id="53" dur="500"/>
+                                        <p:tgtEl>
+                                          <p:spTgt spid="41"/>
                                         </p:tgtEl>
                                       </p:cBhvr>
                                     </p:animEffect>
                                   </p:childTnLst>
                                 </p:cTn>
                               </p:par>
-                            </p:childTnLst>
-                          </p:cTn>
-                        </p:par>
-                      </p:childTnLst>
-                    </p:cTn>
-                  </p:par>
-                  <p:par>
-                    <p:cTn id="33" fill="hold">
-                      <p:stCondLst>
-                        <p:cond delay="indefinite"/>
-                      </p:stCondLst>
-                      <p:childTnLst>
-                        <p:par>
-                          <p:cTn id="34" fill="hold">
-                            <p:stCondLst>
-                              <p:cond delay="0"/>
-                            </p:stCondLst>
-                            <p:childTnLst>
                               <p:par>
-                                <p:cTn id="35" presetID="10" presetClass="entr" presetSubtype="0" fill="hold" grpId="0" nodeType="clickEffect">
+                                <p:cTn id="54" presetID="22" presetClass="entr" presetSubtype="4" fill="hold" grpId="0" nodeType="withEffect">
                                   <p:stCondLst>
                                     <p:cond delay="0"/>
                                   </p:stCondLst>
                                   <p:childTnLst>
                                     <p:set>
                                       <p:cBhvr>
-                                        <p:cTn id="36" dur="1" fill="hold">
-                                          <p:stCondLst>
-                                            <p:cond delay="0"/>
-                                          </p:stCondLst>
-                                        </p:cTn>
-                                        <p:tgtEl>
-                                          <p:spTgt spid="120"/>
-                                        </p:tgtEl>
-                                        <p:attrNameLst>
-                                          <p:attrName>style.visibility</p:attrName>
-                                        </p:attrNameLst>
-                                      </p:cBhvr>
-                                      <p:to>
-                                        <p:strVal val="visible"/>
-                                      </p:to>
-                                    </p:set>
-                                    <p:animEffect transition="in" filter="fade">
-                                      <p:cBhvr>
-                                        <p:cTn id="37" dur="500"/>
-                                        <p:tgtEl>
-                                          <p:spTgt spid="120"/>
-                                        </p:tgtEl>
-                                      </p:cBhvr>
-                                    </p:animEffect>
-                                  </p:childTnLst>
-                                </p:cTn>
-                              </p:par>
-                            </p:childTnLst>
-                          </p:cTn>
-                        </p:par>
-                      </p:childTnLst>
-                    </p:cTn>
-                  </p:par>
-                  <p:par>
-                    <p:cTn id="38" fill="hold">
-                      <p:stCondLst>
-                        <p:cond delay="indefinite"/>
-                      </p:stCondLst>
-                      <p:childTnLst>
-                        <p:par>
-                          <p:cTn id="39" fill="hold">
-                            <p:stCondLst>
-                              <p:cond delay="0"/>
-                            </p:stCondLst>
-                            <p:childTnLst>
-                              <p:par>
-                                <p:cTn id="40" presetID="10" presetClass="entr" presetSubtype="0" fill="hold" grpId="0" nodeType="clickEffect">
-                                  <p:stCondLst>
-                                    <p:cond delay="0"/>
-                                  </p:stCondLst>
-                                  <p:childTnLst>
-                                    <p:set>
-                                      <p:cBhvr>
-                                        <p:cTn id="41" dur="1" fill="hold">
-                                          <p:stCondLst>
-                                            <p:cond delay="0"/>
-                                          </p:stCondLst>
-                                        </p:cTn>
-                                        <p:tgtEl>
-                                          <p:spTgt spid="121"/>
-                                        </p:tgtEl>
-                                        <p:attrNameLst>
-                                          <p:attrName>style.visibility</p:attrName>
-                                        </p:attrNameLst>
-                                      </p:cBhvr>
-                                      <p:to>
-                                        <p:strVal val="visible"/>
-                                      </p:to>
-                                    </p:set>
-                                    <p:animEffect transition="in" filter="fade">
-                                      <p:cBhvr>
-                                        <p:cTn id="42" dur="500"/>
-                                        <p:tgtEl>
-                                          <p:spTgt spid="121"/>
-                                        </p:tgtEl>
-                                      </p:cBhvr>
-                                    </p:animEffect>
-                                  </p:childTnLst>
-                                </p:cTn>
-                              </p:par>
-                              <p:par>
-                                <p:cTn id="43" presetID="10" presetClass="entr" presetSubtype="0" fill="hold" nodeType="withEffect">
-                                  <p:stCondLst>
-                                    <p:cond delay="0"/>
-                                  </p:stCondLst>
-                                  <p:childTnLst>
-                                    <p:set>
-                                      <p:cBhvr>
-                                        <p:cTn id="44" dur="1" fill="hold">
-                                          <p:stCondLst>
-                                            <p:cond delay="0"/>
-                                          </p:stCondLst>
-                                        </p:cTn>
-                                        <p:tgtEl>
-                                          <p:spTgt spid="130"/>
-                                        </p:tgtEl>
-                                        <p:attrNameLst>
-                                          <p:attrName>style.visibility</p:attrName>
-                                        </p:attrNameLst>
-                                      </p:cBhvr>
-                                      <p:to>
-                                        <p:strVal val="visible"/>
-                                      </p:to>
-                                    </p:set>
-                                    <p:animEffect transition="in" filter="fade">
-                                      <p:cBhvr>
-                                        <p:cTn id="45" dur="500"/>
-                                        <p:tgtEl>
-                                          <p:spTgt spid="130"/>
-                                        </p:tgtEl>
-                                      </p:cBhvr>
-                                    </p:animEffect>
-                                  </p:childTnLst>
-                                </p:cTn>
-                              </p:par>
-                              <p:par>
-                                <p:cTn id="46" presetID="10" presetClass="entr" presetSubtype="0" fill="hold" nodeType="withEffect">
-                                  <p:stCondLst>
-                                    <p:cond delay="0"/>
-                                  </p:stCondLst>
-                                  <p:childTnLst>
-                                    <p:set>
-                                      <p:cBhvr>
-                                        <p:cTn id="47" dur="1" fill="hold">
-                                          <p:stCondLst>
-                                            <p:cond delay="0"/>
-                                          </p:stCondLst>
-                                        </p:cTn>
-                                        <p:tgtEl>
-                                          <p:spTgt spid="133"/>
-                                        </p:tgtEl>
-                                        <p:attrNameLst>
-                                          <p:attrName>style.visibility</p:attrName>
-                                        </p:attrNameLst>
-                                      </p:cBhvr>
-                                      <p:to>
-                                        <p:strVal val="visible"/>
-                                      </p:to>
-                                    </p:set>
-                                    <p:animEffect transition="in" filter="fade">
-                                      <p:cBhvr>
-                                        <p:cTn id="48" dur="500"/>
-                                        <p:tgtEl>
-                                          <p:spTgt spid="133"/>
-                                        </p:tgtEl>
-                                      </p:cBhvr>
-                                    </p:animEffect>
-                                  </p:childTnLst>
-                                </p:cTn>
-                              </p:par>
-                            </p:childTnLst>
-                          </p:cTn>
-                        </p:par>
-                      </p:childTnLst>
-                    </p:cTn>
-                  </p:par>
-                  <p:par>
-                    <p:cTn id="49" fill="hold">
-                      <p:stCondLst>
-                        <p:cond delay="indefinite"/>
-                      </p:stCondLst>
-                      <p:childTnLst>
-                        <p:par>
-                          <p:cTn id="50" fill="hold">
-                            <p:stCondLst>
-                              <p:cond delay="0"/>
-                            </p:stCondLst>
-                            <p:childTnLst>
-                              <p:par>
-                                <p:cTn id="51" presetID="10" presetClass="entr" presetSubtype="0" fill="hold" grpId="0" nodeType="clickEffect">
-                                  <p:stCondLst>
-                                    <p:cond delay="0"/>
-                                  </p:stCondLst>
-                                  <p:childTnLst>
-                                    <p:set>
-                                      <p:cBhvr>
-                                        <p:cTn id="52" dur="1" fill="hold">
-                                          <p:stCondLst>
-                                            <p:cond delay="0"/>
-                                          </p:stCondLst>
-                                        </p:cTn>
-                                        <p:tgtEl>
-                                          <p:spTgt spid="139"/>
-                                        </p:tgtEl>
-                                        <p:attrNameLst>
-                                          <p:attrName>style.visibility</p:attrName>
-                                        </p:attrNameLst>
-                                      </p:cBhvr>
-                                      <p:to>
-                                        <p:strVal val="visible"/>
-                                      </p:to>
-                                    </p:set>
-                                    <p:animEffect transition="in" filter="fade">
-                                      <p:cBhvr>
-                                        <p:cTn id="53" dur="500"/>
-                                        <p:tgtEl>
-                                          <p:spTgt spid="139"/>
-                                        </p:tgtEl>
-                                      </p:cBhvr>
-                                    </p:animEffect>
-                                  </p:childTnLst>
-                                </p:cTn>
-                              </p:par>
-                              <p:par>
-                                <p:cTn id="54" presetID="10" presetClass="entr" presetSubtype="0" fill="hold" nodeType="withEffect">
-                                  <p:stCondLst>
-                                    <p:cond delay="0"/>
-                                  </p:stCondLst>
-                                  <p:childTnLst>
-                                    <p:set>
-                                      <p:cBhvr>
                                         <p:cTn id="55" dur="1" fill="hold">
                                           <p:stCondLst>
                                             <p:cond delay="0"/>
                                           </p:stCondLst>
                                         </p:cTn>
                                         <p:tgtEl>
-                                          <p:spTgt spid="140"/>
+                                          <p:spTgt spid="42"/>
                                         </p:tgtEl>
                                         <p:attrNameLst>
                                           <p:attrName>style.visibility</p:attrName>
@@ -4556,46 +4511,11 @@
                                         <p:strVal val="visible"/>
                                       </p:to>
                                     </p:set>
-                                    <p:animEffect transition="in" filter="fade">
+                                    <p:animEffect transition="in" filter="wipe(down)">
                                       <p:cBhvr>
                                         <p:cTn id="56" dur="500"/>
                                         <p:tgtEl>
-                                          <p:spTgt spid="140"/>
-                                        </p:tgtEl>
-                                      </p:cBhvr>
-                                    </p:animEffect>
-                                  </p:childTnLst>
-                                </p:cTn>
-                              </p:par>
-                              <p:par>
-                                <p:cTn id="57" presetID="10" presetClass="entr" presetSubtype="0" fill="hold" nodeType="withEffect">
-                                  <p:stCondLst>
-                                    <p:cond delay="0"/>
-                                  </p:stCondLst>
-                                  <p:childTnLst>
-                                    <p:set>
-                                      <p:cBhvr>
-                                        <p:cTn id="58" dur="1" fill="hold">
-                                          <p:stCondLst>
-                                            <p:cond delay="0"/>
-                                          </p:stCondLst>
-                                        </p:cTn>
-                                        <p:tgtEl>
-                                          <p:spTgt spid="143"/>
-                                        </p:tgtEl>
-                                        <p:attrNameLst>
-                                          <p:attrName>style.visibility</p:attrName>
-                                        </p:attrNameLst>
-                                      </p:cBhvr>
-                                      <p:to>
-                                        <p:strVal val="visible"/>
-                                      </p:to>
-                                    </p:set>
-                                    <p:animEffect transition="in" filter="fade">
-                                      <p:cBhvr>
-                                        <p:cTn id="59" dur="500"/>
-                                        <p:tgtEl>
-                                          <p:spTgt spid="143"/>
+                                          <p:spTgt spid="42"/>
                                         </p:tgtEl>
                                       </p:cBhvr>
                                     </p:animEffect>
@@ -4724,13 +4644,6 @@
   <p:clrMapOvr>
     <a:masterClrMapping/>
   </p:clrMapOvr>
-  <p:timing>
-    <p:tnLst>
-      <p:par>
-        <p:cTn id="1" dur="indefinite" restart="never" nodeType="tmRoot"/>
-      </p:par>
-    </p:tnLst>
-  </p:timing>
 </p:sld>
 </file>
 
@@ -4799,14 +4712,11 @@
           </a:lstStyle>
           <a:p>
             <a:r>
-              <a:rPr lang="ru-RU" sz="6023" b="1" dirty="0" smtClean="0">
+              <a:rPr lang="ru-RU" sz="6023" b="1" dirty="0">
                 <a:latin typeface="Bahnschrift Condensed" panose="020B0502040204020203" pitchFamily="34" charset="0"/>
               </a:rPr>
               <a:t>Вводная часть</a:t>
             </a:r>
-            <a:endParaRPr lang="ru-RU" sz="6023" b="1" dirty="0">
-              <a:latin typeface="Bahnschrift Condensed" panose="020B0502040204020203" pitchFamily="34" charset="0"/>
-            </a:endParaRPr>
           </a:p>
         </p:txBody>
       </p:sp>
@@ -4839,14 +4749,11 @@
           <a:lstStyle/>
           <a:p>
             <a:r>
-              <a:rPr lang="ru-RU" sz="4000" b="1" dirty="0" smtClean="0">
+              <a:rPr lang="ru-RU" sz="4000" b="1" dirty="0">
                 <a:latin typeface="Bahnschrift Condensed" panose="020B0502040204020203" pitchFamily="34" charset="0"/>
               </a:rPr>
               <a:t>Проблемы</a:t>
             </a:r>
-            <a:endParaRPr lang="ru-RU" sz="4000" b="1" dirty="0">
-              <a:latin typeface="Bahnschrift Condensed" panose="020B0502040204020203" pitchFamily="34" charset="0"/>
-            </a:endParaRPr>
           </a:p>
         </p:txBody>
       </p:sp>
@@ -4882,19 +4789,19 @@
               <a:buAutoNum type="arabicParenR"/>
             </a:pPr>
             <a:r>
-              <a:rPr lang="ru-RU" sz="3400" b="1" dirty="0" smtClean="0">
+              <a:rPr lang="ru-RU" sz="3400" b="1" dirty="0">
                 <a:latin typeface="Bahnschrift Condensed" panose="020B0502040204020203" pitchFamily="34" charset="0"/>
               </a:rPr>
               <a:t>Автоматизированный контроль за развитием пользователями файла сохранения мира игры </a:t>
             </a:r>
             <a:r>
-              <a:rPr lang="en-US" sz="3400" b="1" dirty="0" smtClean="0">
+              <a:rPr lang="en-US" sz="3400" b="1" dirty="0">
                 <a:latin typeface="Bahnschrift Condensed" panose="020B0502040204020203" pitchFamily="34" charset="0"/>
               </a:rPr>
               <a:t>Satisfactory</a:t>
             </a:r>
             <a:r>
-              <a:rPr lang="ru-RU" sz="3400" b="1" dirty="0" smtClean="0">
+              <a:rPr lang="ru-RU" sz="3400" b="1" dirty="0">
                 <a:latin typeface="Bahnschrift Condensed" panose="020B0502040204020203" pitchFamily="34" charset="0"/>
               </a:rPr>
               <a:t>.</a:t>
@@ -4905,14 +4812,11 @@
               <a:buAutoNum type="arabicParenR"/>
             </a:pPr>
             <a:r>
-              <a:rPr lang="ru-RU" sz="3400" b="1" dirty="0" smtClean="0">
+              <a:rPr lang="ru-RU" sz="3400" b="1" dirty="0">
                 <a:latin typeface="Bahnschrift Condensed" panose="020B0502040204020203" pitchFamily="34" charset="0"/>
               </a:rPr>
               <a:t>Доступ к данным, благодаря которым остальные могут подключится к активному пользователю</a:t>
             </a:r>
-            <a:endParaRPr lang="ru-RU" sz="3400" b="1" dirty="0">
-              <a:latin typeface="Bahnschrift Condensed" panose="020B0502040204020203" pitchFamily="34" charset="0"/>
-            </a:endParaRPr>
           </a:p>
         </p:txBody>
       </p:sp>
@@ -4983,7 +4887,7 @@
               <a:buAutoNum type="arabicParenR"/>
             </a:pPr>
             <a:r>
-              <a:rPr lang="ru-RU" sz="3400" b="1" dirty="0" smtClean="0">
+              <a:rPr lang="ru-RU" sz="3400" b="1" dirty="0">
                 <a:latin typeface="Bahnschrift Condensed" panose="020B0502040204020203" pitchFamily="34" charset="0"/>
               </a:rPr>
               <a:t>Реализовать сайт, решающий проблемы 1 и 2</a:t>
@@ -4994,18 +4898,18 @@
               <a:buAutoNum type="arabicParenR"/>
             </a:pPr>
             <a:r>
-              <a:rPr lang="ru-RU" sz="3400" b="1" dirty="0" smtClean="0">
+              <a:rPr lang="ru-RU" sz="3400" b="1" dirty="0">
                 <a:latin typeface="Bahnschrift Condensed" panose="020B0502040204020203" pitchFamily="34" charset="0"/>
               </a:rPr>
               <a:t>Реализовать формы авторизации и регистрации через </a:t>
             </a:r>
             <a:r>
-              <a:rPr lang="ru-RU" sz="3400" b="1" dirty="0" err="1" smtClean="0">
+              <a:rPr lang="ru-RU" sz="3400" b="1" dirty="0" err="1">
                 <a:latin typeface="Bahnschrift Condensed" panose="020B0502040204020203" pitchFamily="34" charset="0"/>
               </a:rPr>
               <a:t>дискорд</a:t>
             </a:r>
-            <a:endParaRPr lang="ru-RU" sz="3400" b="1" dirty="0" smtClean="0">
+            <a:endParaRPr lang="ru-RU" sz="3400" b="1" dirty="0">
               <a:latin typeface="Bahnschrift Condensed" panose="020B0502040204020203" pitchFamily="34" charset="0"/>
             </a:endParaRPr>
           </a:p>
@@ -5014,38 +4918,35 @@
               <a:buAutoNum type="arabicParenR"/>
             </a:pPr>
             <a:r>
-              <a:rPr lang="ru-RU" sz="3400" b="1" dirty="0" smtClean="0">
+              <a:rPr lang="ru-RU" sz="3400" b="1" dirty="0">
                 <a:latin typeface="Bahnschrift Condensed" panose="020B0502040204020203" pitchFamily="34" charset="0"/>
               </a:rPr>
               <a:t>Создать </a:t>
             </a:r>
             <a:r>
-              <a:rPr lang="ru-RU" sz="3400" b="1" dirty="0" err="1" smtClean="0">
+              <a:rPr lang="ru-RU" sz="3400" b="1" dirty="0" err="1">
                 <a:latin typeface="Bahnschrift Condensed" panose="020B0502040204020203" pitchFamily="34" charset="0"/>
               </a:rPr>
               <a:t>дискорд</a:t>
             </a:r>
             <a:r>
-              <a:rPr lang="ru-RU" sz="3400" b="1" dirty="0" smtClean="0">
+              <a:rPr lang="ru-RU" sz="3400" b="1" dirty="0">
                 <a:latin typeface="Bahnschrift Condensed" panose="020B0502040204020203" pitchFamily="34" charset="0"/>
               </a:rPr>
               <a:t>-бота, проверяющего наличие пользователя на главном </a:t>
             </a:r>
             <a:r>
-              <a:rPr lang="ru-RU" sz="3400" b="1" dirty="0" err="1" smtClean="0">
+              <a:rPr lang="ru-RU" sz="3400" b="1" dirty="0" err="1">
                 <a:latin typeface="Bahnschrift Condensed" panose="020B0502040204020203" pitchFamily="34" charset="0"/>
               </a:rPr>
               <a:t>дискорд</a:t>
             </a:r>
             <a:r>
-              <a:rPr lang="ru-RU" sz="3400" b="1" dirty="0" smtClean="0">
+              <a:rPr lang="ru-RU" sz="3400" b="1" dirty="0">
                 <a:latin typeface="Bahnschrift Condensed" panose="020B0502040204020203" pitchFamily="34" charset="0"/>
               </a:rPr>
               <a:t>-сервере</a:t>
             </a:r>
-            <a:endParaRPr lang="ru-RU" sz="3400" b="1" dirty="0">
-              <a:latin typeface="Bahnschrift Condensed" panose="020B0502040204020203" pitchFamily="34" charset="0"/>
-            </a:endParaRPr>
           </a:p>
         </p:txBody>
       </p:sp>
@@ -5071,9 +4972,6 @@
                     <p:cTn id="3" fill="hold">
                       <p:stCondLst>
                         <p:cond delay="indefinite"/>
-                        <p:cond evt="onBegin" delay="0">
-                          <p:tn val="2"/>
-                        </p:cond>
                       </p:stCondLst>
                       <p:childTnLst>
                         <p:par>
@@ -5083,7 +4981,7 @@
                             </p:stCondLst>
                             <p:childTnLst>
                               <p:par>
-                                <p:cTn id="5" presetID="10" presetClass="entr" presetSubtype="0" fill="hold" grpId="0" nodeType="withEffect">
+                                <p:cTn id="5" presetID="10" presetClass="entr" presetSubtype="0" fill="hold" grpId="0" nodeType="clickEffect">
                                   <p:stCondLst>
                                     <p:cond delay="0"/>
                                   </p:stCondLst>
@@ -5324,14 +5222,11 @@
           </a:lstStyle>
           <a:p>
             <a:r>
-              <a:rPr lang="ru-RU" sz="6023" b="1" dirty="0" smtClean="0">
+              <a:rPr lang="ru-RU" sz="6023" b="1" dirty="0">
                 <a:latin typeface="Bahnschrift Condensed" panose="020B0502040204020203" pitchFamily="34" charset="0"/>
               </a:rPr>
               <a:t>Главная страница</a:t>
             </a:r>
-            <a:endParaRPr lang="ru-RU" sz="6023" b="1" dirty="0">
-              <a:latin typeface="Bahnschrift Condensed" panose="020B0502040204020203" pitchFamily="34" charset="0"/>
-            </a:endParaRPr>
           </a:p>
         </p:txBody>
       </p:sp>
@@ -5372,7 +5267,83 @@
   <p:timing>
     <p:tnLst>
       <p:par>
-        <p:cTn id="1" dur="indefinite" restart="never" nodeType="tmRoot"/>
+        <p:cTn id="1" dur="indefinite" restart="never" nodeType="tmRoot">
+          <p:childTnLst>
+            <p:seq concurrent="1" nextAc="seek">
+              <p:cTn id="2" dur="indefinite" nodeType="mainSeq">
+                <p:childTnLst>
+                  <p:par>
+                    <p:cTn id="3" fill="hold">
+                      <p:stCondLst>
+                        <p:cond delay="indefinite"/>
+                      </p:stCondLst>
+                      <p:childTnLst>
+                        <p:par>
+                          <p:cTn id="4" fill="hold">
+                            <p:stCondLst>
+                              <p:cond delay="0"/>
+                            </p:stCondLst>
+                            <p:childTnLst>
+                              <p:par>
+                                <p:cTn id="5" presetID="22" presetClass="entr" presetSubtype="4" fill="hold" nodeType="clickEffect">
+                                  <p:stCondLst>
+                                    <p:cond delay="0"/>
+                                  </p:stCondLst>
+                                  <p:childTnLst>
+                                    <p:set>
+                                      <p:cBhvr>
+                                        <p:cTn id="6" dur="1" fill="hold">
+                                          <p:stCondLst>
+                                            <p:cond delay="0"/>
+                                          </p:stCondLst>
+                                        </p:cTn>
+                                        <p:tgtEl>
+                                          <p:spTgt spid="3"/>
+                                        </p:tgtEl>
+                                        <p:attrNameLst>
+                                          <p:attrName>style.visibility</p:attrName>
+                                        </p:attrNameLst>
+                                      </p:cBhvr>
+                                      <p:to>
+                                        <p:strVal val="visible"/>
+                                      </p:to>
+                                    </p:set>
+                                    <p:animEffect transition="in" filter="wipe(down)">
+                                      <p:cBhvr>
+                                        <p:cTn id="7" dur="500"/>
+                                        <p:tgtEl>
+                                          <p:spTgt spid="3"/>
+                                        </p:tgtEl>
+                                      </p:cBhvr>
+                                    </p:animEffect>
+                                  </p:childTnLst>
+                                </p:cTn>
+                              </p:par>
+                            </p:childTnLst>
+                          </p:cTn>
+                        </p:par>
+                      </p:childTnLst>
+                    </p:cTn>
+                  </p:par>
+                </p:childTnLst>
+              </p:cTn>
+              <p:prevCondLst>
+                <p:cond evt="onPrev" delay="0">
+                  <p:tgtEl>
+                    <p:sldTgt/>
+                  </p:tgtEl>
+                </p:cond>
+              </p:prevCondLst>
+              <p:nextCondLst>
+                <p:cond evt="onNext" delay="0">
+                  <p:tgtEl>
+                    <p:sldTgt/>
+                  </p:tgtEl>
+                </p:cond>
+              </p:nextCondLst>
+            </p:seq>
+          </p:childTnLst>
+        </p:cTn>
       </p:par>
     </p:tnLst>
   </p:timing>
@@ -5444,14 +5415,11 @@
           </a:lstStyle>
           <a:p>
             <a:r>
-              <a:rPr lang="ru-RU" sz="6023" b="1" dirty="0" smtClean="0">
+              <a:rPr lang="ru-RU" sz="6023" b="1" dirty="0">
                 <a:latin typeface="Bahnschrift Condensed" panose="020B0502040204020203" pitchFamily="34" charset="0"/>
               </a:rPr>
               <a:t>Регистрация</a:t>
             </a:r>
-            <a:endParaRPr lang="ru-RU" sz="6023" b="1" dirty="0">
-              <a:latin typeface="Bahnschrift Condensed" panose="020B0502040204020203" pitchFamily="34" charset="0"/>
-            </a:endParaRPr>
           </a:p>
         </p:txBody>
       </p:sp>
@@ -5563,14 +5531,11 @@
           </a:lstStyle>
           <a:p>
             <a:r>
-              <a:rPr lang="ru-RU" sz="6023" b="1" dirty="0" smtClean="0">
+              <a:rPr lang="ru-RU" sz="6023" b="1" dirty="0">
                 <a:latin typeface="Bahnschrift Condensed" panose="020B0502040204020203" pitchFamily="34" charset="0"/>
               </a:rPr>
               <a:t>Авторизация</a:t>
             </a:r>
-            <a:endParaRPr lang="ru-RU" sz="6023" b="1" dirty="0">
-              <a:latin typeface="Bahnschrift Condensed" panose="020B0502040204020203" pitchFamily="34" charset="0"/>
-            </a:endParaRPr>
           </a:p>
         </p:txBody>
       </p:sp>
@@ -5622,14 +5587,11 @@
           </a:lstStyle>
           <a:p>
             <a:r>
-              <a:rPr lang="ru-RU" sz="6023" b="1" dirty="0" smtClean="0">
+              <a:rPr lang="ru-RU" sz="6023" b="1" dirty="0">
                 <a:latin typeface="Bahnschrift Condensed" panose="020B0502040204020203" pitchFamily="34" charset="0"/>
               </a:rPr>
               <a:t>Вход пользователя</a:t>
             </a:r>
-            <a:endParaRPr lang="ru-RU" sz="6023" b="1" dirty="0">
-              <a:latin typeface="Bahnschrift Condensed" panose="020B0502040204020203" pitchFamily="34" charset="0"/>
-            </a:endParaRPr>
           </a:p>
         </p:txBody>
       </p:sp>
@@ -5655,9 +5617,6 @@
                     <p:cTn id="3" fill="hold">
                       <p:stCondLst>
                         <p:cond delay="indefinite"/>
-                        <p:cond evt="onBegin" delay="0">
-                          <p:tn val="2"/>
-                        </p:cond>
                       </p:stCondLst>
                       <p:childTnLst>
                         <p:par>
@@ -5667,7 +5626,7 @@
                             </p:stCondLst>
                             <p:childTnLst>
                               <p:par>
-                                <p:cTn id="5" presetID="22" presetClass="entr" presetSubtype="4" fill="hold" grpId="0" nodeType="withEffect">
+                                <p:cTn id="5" presetID="22" presetClass="entr" presetSubtype="4" fill="hold" grpId="0" nodeType="clickEffect">
                                   <p:stCondLst>
                                     <p:cond delay="0"/>
                                   </p:stCondLst>
@@ -5924,14 +5883,11 @@
           </a:lstStyle>
           <a:p>
             <a:r>
-              <a:rPr lang="ru-RU" sz="6023" b="1" dirty="0" smtClean="0">
+              <a:rPr lang="ru-RU" sz="6023" b="1" dirty="0">
                 <a:latin typeface="Bahnschrift Condensed" panose="020B0502040204020203" pitchFamily="34" charset="0"/>
               </a:rPr>
               <a:t>Открытие доступа другим</a:t>
             </a:r>
-            <a:endParaRPr lang="ru-RU" sz="6023" b="1" dirty="0">
-              <a:latin typeface="Bahnschrift Condensed" panose="020B0502040204020203" pitchFamily="34" charset="0"/>
-            </a:endParaRPr>
           </a:p>
         </p:txBody>
       </p:sp>
@@ -6402,14 +6358,11 @@
           </a:lstStyle>
           <a:p>
             <a:r>
-              <a:rPr lang="ru-RU" sz="6023" b="1" dirty="0" smtClean="0">
+              <a:rPr lang="ru-RU" sz="6023" b="1" dirty="0">
                 <a:latin typeface="Bahnschrift Condensed" panose="020B0502040204020203" pitchFamily="34" charset="0"/>
               </a:rPr>
               <a:t>Помощь проекту</a:t>
             </a:r>
-            <a:endParaRPr lang="ru-RU" sz="6023" b="1" dirty="0">
-              <a:latin typeface="Bahnschrift Condensed" panose="020B0502040204020203" pitchFamily="34" charset="0"/>
-            </a:endParaRPr>
           </a:p>
         </p:txBody>
       </p:sp>
@@ -6822,14 +6775,11 @@
           </a:lstStyle>
           <a:p>
             <a:r>
-              <a:rPr lang="ru-RU" sz="6023" b="1" dirty="0" smtClean="0">
+              <a:rPr lang="ru-RU" sz="6023" b="1" dirty="0">
                 <a:latin typeface="Bahnschrift Condensed" panose="020B0502040204020203" pitchFamily="34" charset="0"/>
               </a:rPr>
               <a:t>Структура БД</a:t>
             </a:r>
-            <a:endParaRPr lang="ru-RU" sz="6023" b="1" dirty="0">
-              <a:latin typeface="Bahnschrift Condensed" panose="020B0502040204020203" pitchFamily="34" charset="0"/>
-            </a:endParaRPr>
           </a:p>
         </p:txBody>
       </p:sp>
@@ -6894,7 +6844,7 @@
             <a:p>
               <a:pPr algn="ctr"/>
               <a:r>
-                <a:rPr lang="en-US" dirty="0" smtClean="0">
+                <a:rPr lang="en-US" dirty="0">
                   <a:solidFill>
                     <a:schemeClr val="tx1"/>
                   </a:solidFill>
@@ -6957,31 +6907,18 @@
             <a:p>
               <a:pPr algn="ctr"/>
               <a:r>
-                <a:rPr lang="en-US" sz="1600" dirty="0" smtClean="0">
-                  <a:solidFill>
-                    <a:schemeClr val="tx1"/>
-                  </a:solidFill>
-                </a:rPr>
-                <a:t>id: </a:t>
-              </a:r>
-              <a:r>
                 <a:rPr lang="en-US" sz="1600" dirty="0">
                   <a:solidFill>
                     <a:schemeClr val="tx1"/>
                   </a:solidFill>
                 </a:rPr>
-                <a:t>integer</a:t>
+                <a:t>id: integer</a:t>
               </a:r>
-              <a:endParaRPr lang="en-US" sz="1600" dirty="0" smtClean="0">
-                <a:solidFill>
-                  <a:schemeClr val="tx1"/>
-                </a:solidFill>
-              </a:endParaRPr>
             </a:p>
             <a:p>
               <a:pPr algn="ctr"/>
               <a:r>
-                <a:rPr lang="en-US" sz="1600" dirty="0" smtClean="0">
+                <a:rPr lang="en-US" sz="1600" dirty="0">
                   <a:solidFill>
                     <a:schemeClr val="tx1"/>
                   </a:solidFill>
@@ -6992,7 +6929,7 @@
             <a:p>
               <a:pPr algn="ctr"/>
               <a:r>
-                <a:rPr lang="en-US" sz="1600" dirty="0" smtClean="0">
+                <a:rPr lang="en-US" sz="1600" dirty="0">
                   <a:solidFill>
                     <a:schemeClr val="tx1"/>
                   </a:solidFill>
@@ -7003,7 +6940,7 @@
             <a:p>
               <a:pPr algn="ctr"/>
               <a:r>
-                <a:rPr lang="en-US" sz="1600" dirty="0" err="1" smtClean="0">
+                <a:rPr lang="en-US" sz="1600" dirty="0" err="1">
                   <a:solidFill>
                     <a:schemeClr val="tx1"/>
                   </a:solidFill>
@@ -7011,7 +6948,7 @@
                 <a:t>registration_date</a:t>
               </a:r>
               <a:r>
-                <a:rPr lang="en-US" sz="1600" dirty="0" smtClean="0">
+                <a:rPr lang="en-US" sz="1600" dirty="0">
                   <a:solidFill>
                     <a:schemeClr val="tx1"/>
                   </a:solidFill>
@@ -7022,7 +6959,7 @@
             <a:p>
               <a:pPr algn="ctr"/>
               <a:r>
-                <a:rPr lang="en-US" sz="1600" dirty="0" err="1" smtClean="0">
+                <a:rPr lang="en-US" sz="1600" dirty="0" err="1">
                   <a:solidFill>
                     <a:schemeClr val="tx1"/>
                   </a:solidFill>
@@ -7030,7 +6967,7 @@
                 <a:t>hashed_password</a:t>
               </a:r>
               <a:r>
-                <a:rPr lang="en-US" sz="1600" dirty="0" smtClean="0">
+                <a:rPr lang="en-US" sz="1600" dirty="0">
                   <a:solidFill>
                     <a:schemeClr val="tx1"/>
                   </a:solidFill>
@@ -7041,7 +6978,7 @@
             <a:p>
               <a:pPr algn="ctr"/>
               <a:r>
-                <a:rPr lang="en-US" sz="1600" dirty="0" smtClean="0">
+                <a:rPr lang="en-US" sz="1600" dirty="0">
                   <a:solidFill>
                     <a:schemeClr val="tx1"/>
                   </a:solidFill>
@@ -7052,7 +6989,7 @@
             <a:p>
               <a:pPr algn="ctr"/>
               <a:r>
-                <a:rPr lang="en-US" sz="1600" dirty="0" smtClean="0">
+                <a:rPr lang="en-US" sz="1600" dirty="0">
                   <a:solidFill>
                     <a:schemeClr val="tx1"/>
                   </a:solidFill>
@@ -7124,7 +7061,7 @@
             <a:p>
               <a:pPr algn="ctr"/>
               <a:r>
-                <a:rPr lang="en-US" dirty="0" smtClean="0">
+                <a:rPr lang="en-US" dirty="0">
                   <a:solidFill>
                     <a:schemeClr val="tx1"/>
                   </a:solidFill>
@@ -7187,7 +7124,7 @@
             <a:p>
               <a:pPr algn="ctr"/>
               <a:r>
-                <a:rPr lang="en-US" dirty="0" err="1" smtClean="0">
+                <a:rPr lang="en-US" dirty="0" err="1">
                   <a:solidFill>
                     <a:schemeClr val="tx1"/>
                   </a:solidFill>
@@ -7195,71 +7132,7 @@
                 <a:t>session_id</a:t>
               </a:r>
               <a:r>
-                <a:rPr lang="en-US" dirty="0" smtClean="0">
-                  <a:solidFill>
-                    <a:schemeClr val="tx1"/>
-                  </a:solidFill>
-                </a:rPr>
-                <a:t>: </a:t>
-              </a:r>
-              <a:r>
                 <a:rPr lang="en-US" dirty="0">
-                  <a:solidFill>
-                    <a:schemeClr val="tx1"/>
-                  </a:solidFill>
-                </a:rPr>
-                <a:t>integer</a:t>
-              </a:r>
-              <a:endParaRPr lang="en-US" dirty="0" smtClean="0">
-                <a:solidFill>
-                  <a:schemeClr val="tx1"/>
-                </a:solidFill>
-              </a:endParaRPr>
-            </a:p>
-            <a:p>
-              <a:pPr algn="ctr"/>
-              <a:r>
-                <a:rPr lang="en-US" dirty="0" err="1" smtClean="0">
-                  <a:solidFill>
-                    <a:schemeClr val="tx1"/>
-                  </a:solidFill>
-                </a:rPr>
-                <a:t>creator_id</a:t>
-              </a:r>
-              <a:r>
-                <a:rPr lang="en-US" dirty="0" smtClean="0">
-                  <a:solidFill>
-                    <a:schemeClr val="tx1"/>
-                  </a:solidFill>
-                </a:rPr>
-                <a:t>: </a:t>
-              </a:r>
-              <a:r>
-                <a:rPr lang="en-US" dirty="0">
-                  <a:solidFill>
-                    <a:schemeClr val="tx1"/>
-                  </a:solidFill>
-                </a:rPr>
-                <a:t>integer</a:t>
-              </a:r>
-              <a:endParaRPr lang="en-US" dirty="0" smtClean="0">
-                <a:solidFill>
-                  <a:schemeClr val="tx1"/>
-                </a:solidFill>
-              </a:endParaRPr>
-            </a:p>
-            <a:p>
-              <a:pPr algn="ctr"/>
-              <a:r>
-                <a:rPr lang="en-US" dirty="0" err="1" smtClean="0">
-                  <a:solidFill>
-                    <a:schemeClr val="tx1"/>
-                  </a:solidFill>
-                </a:rPr>
-                <a:t>last_opener_id</a:t>
-              </a:r>
-              <a:r>
-                <a:rPr lang="en-US" dirty="0" smtClean="0">
                   <a:solidFill>
                     <a:schemeClr val="tx1"/>
                   </a:solidFill>
@@ -7270,7 +7143,45 @@
             <a:p>
               <a:pPr algn="ctr"/>
               <a:r>
-                <a:rPr lang="en-US" dirty="0" smtClean="0">
+                <a:rPr lang="en-US" dirty="0" err="1">
+                  <a:solidFill>
+                    <a:schemeClr val="tx1"/>
+                  </a:solidFill>
+                </a:rPr>
+                <a:t>creator_id</a:t>
+              </a:r>
+              <a:r>
+                <a:rPr lang="en-US" dirty="0">
+                  <a:solidFill>
+                    <a:schemeClr val="tx1"/>
+                  </a:solidFill>
+                </a:rPr>
+                <a:t>: integer</a:t>
+              </a:r>
+            </a:p>
+            <a:p>
+              <a:pPr algn="ctr"/>
+              <a:r>
+                <a:rPr lang="en-US" dirty="0" err="1">
+                  <a:solidFill>
+                    <a:schemeClr val="tx1"/>
+                  </a:solidFill>
+                </a:rPr>
+                <a:t>last_opener_id</a:t>
+              </a:r>
+              <a:r>
+                <a:rPr lang="en-US" dirty="0">
+                  <a:solidFill>
+                    <a:schemeClr val="tx1"/>
+                  </a:solidFill>
+                </a:rPr>
+                <a:t>: integer</a:t>
+              </a:r>
+            </a:p>
+            <a:p>
+              <a:pPr algn="ctr"/>
+              <a:r>
+                <a:rPr lang="en-US" dirty="0">
                   <a:solidFill>
                     <a:schemeClr val="tx1"/>
                   </a:solidFill>
@@ -7281,7 +7192,7 @@
             <a:p>
               <a:pPr algn="ctr"/>
               <a:r>
-                <a:rPr lang="en-US" dirty="0" smtClean="0">
+                <a:rPr lang="en-US" dirty="0">
                   <a:solidFill>
                     <a:schemeClr val="tx1"/>
                   </a:solidFill>
@@ -7292,7 +7203,7 @@
             <a:p>
               <a:pPr algn="ctr"/>
               <a:r>
-                <a:rPr lang="en-US" dirty="0" err="1" smtClean="0">
+                <a:rPr lang="en-US" dirty="0" err="1">
                   <a:solidFill>
                     <a:schemeClr val="tx1"/>
                   </a:solidFill>
@@ -7300,7 +7211,7 @@
                 <a:t>photo_path</a:t>
               </a:r>
               <a:r>
-                <a:rPr lang="en-US" dirty="0" smtClean="0">
+                <a:rPr lang="en-US" dirty="0">
                   <a:solidFill>
                     <a:schemeClr val="tx1"/>
                   </a:solidFill>
@@ -7311,7 +7222,7 @@
             <a:p>
               <a:pPr algn="ctr"/>
               <a:r>
-                <a:rPr lang="en-US" dirty="0" err="1" smtClean="0">
+                <a:rPr lang="en-US" dirty="0" err="1">
                   <a:solidFill>
                     <a:schemeClr val="tx1"/>
                   </a:solidFill>
@@ -7319,7 +7230,7 @@
                 <a:t>is_online</a:t>
               </a:r>
               <a:r>
-                <a:rPr lang="en-US" dirty="0" smtClean="0">
+                <a:rPr lang="en-US" dirty="0">
                   <a:solidFill>
                     <a:schemeClr val="tx1"/>
                   </a:solidFill>
@@ -7327,14 +7238,14 @@
                 <a:t>: </a:t>
               </a:r>
               <a:r>
-                <a:rPr lang="en-US" dirty="0" err="1" smtClean="0">
+                <a:rPr lang="en-US" dirty="0" err="1">
                   <a:solidFill>
                     <a:schemeClr val="tx1"/>
                   </a:solidFill>
                 </a:rPr>
                 <a:t>boolean</a:t>
               </a:r>
-              <a:endParaRPr lang="en-US" dirty="0" smtClean="0">
+              <a:endParaRPr lang="en-US" dirty="0">
                 <a:solidFill>
                   <a:schemeClr val="tx1"/>
                 </a:solidFill>
@@ -7343,7 +7254,7 @@
             <a:p>
               <a:pPr algn="ctr"/>
               <a:r>
-                <a:rPr lang="en-US" dirty="0" err="1" smtClean="0">
+                <a:rPr lang="en-US" dirty="0" err="1">
                   <a:solidFill>
                     <a:schemeClr val="tx1"/>
                   </a:solidFill>
@@ -7351,7 +7262,7 @@
                 <a:t>Is_active</a:t>
               </a:r>
               <a:r>
-                <a:rPr lang="en-US" dirty="0" smtClean="0">
+                <a:rPr lang="en-US" dirty="0">
                   <a:solidFill>
                     <a:schemeClr val="tx1"/>
                   </a:solidFill>
@@ -7359,14 +7270,14 @@
                 <a:t>: </a:t>
               </a:r>
               <a:r>
-                <a:rPr lang="en-US" dirty="0" err="1" smtClean="0">
+                <a:rPr lang="en-US" dirty="0" err="1">
                   <a:solidFill>
                     <a:schemeClr val="tx1"/>
                   </a:solidFill>
                 </a:rPr>
                 <a:t>boolean</a:t>
               </a:r>
-              <a:endParaRPr lang="en-US" dirty="0" smtClean="0">
+              <a:endParaRPr lang="en-US" dirty="0">
                 <a:solidFill>
                   <a:schemeClr val="tx1"/>
                 </a:solidFill>
@@ -7375,7 +7286,7 @@
             <a:p>
               <a:pPr algn="ctr"/>
               <a:r>
-                <a:rPr lang="en-US" dirty="0" smtClean="0">
+                <a:rPr lang="en-US" dirty="0">
                   <a:solidFill>
                     <a:schemeClr val="tx1"/>
                   </a:solidFill>
@@ -7383,14 +7294,14 @@
                 <a:t>info: </a:t>
               </a:r>
               <a:r>
-                <a:rPr lang="en-US" dirty="0" err="1" smtClean="0">
+                <a:rPr lang="en-US" dirty="0" err="1">
                   <a:solidFill>
                     <a:schemeClr val="tx1"/>
                   </a:solidFill>
                 </a:rPr>
                 <a:t>json</a:t>
               </a:r>
-              <a:endParaRPr lang="en-US" dirty="0" smtClean="0">
+              <a:endParaRPr lang="en-US" dirty="0">
                 <a:solidFill>
                   <a:schemeClr val="tx1"/>
                 </a:solidFill>
@@ -7399,7 +7310,7 @@
             <a:p>
               <a:pPr algn="ctr"/>
               <a:r>
-                <a:rPr lang="en-US" dirty="0" smtClean="0">
+                <a:rPr lang="en-US" dirty="0">
                   <a:solidFill>
                     <a:schemeClr val="tx1"/>
                   </a:solidFill>
@@ -7471,7 +7382,7 @@
             <a:p>
               <a:pPr algn="ctr"/>
               <a:r>
-                <a:rPr lang="en-US" dirty="0" smtClean="0">
+                <a:rPr lang="en-US" dirty="0">
                   <a:solidFill>
                     <a:schemeClr val="tx1"/>
                   </a:solidFill>
@@ -7534,7 +7445,7 @@
             <a:p>
               <a:pPr algn="ctr"/>
               <a:r>
-                <a:rPr lang="en-US" dirty="0" err="1" smtClean="0">
+                <a:rPr lang="en-US" dirty="0" err="1">
                   <a:solidFill>
                     <a:schemeClr val="tx1"/>
                   </a:solidFill>
@@ -7542,39 +7453,7 @@
                 <a:t>saving_id</a:t>
               </a:r>
               <a:r>
-                <a:rPr lang="en-US" dirty="0" smtClean="0">
-                  <a:solidFill>
-                    <a:schemeClr val="tx1"/>
-                  </a:solidFill>
-                </a:rPr>
-                <a:t>: </a:t>
-              </a:r>
-              <a:r>
                 <a:rPr lang="en-US" dirty="0">
-                  <a:solidFill>
-                    <a:schemeClr val="tx1"/>
-                  </a:solidFill>
-                </a:rPr>
-                <a:t>integer</a:t>
-              </a:r>
-              <a:endParaRPr lang="en-US" dirty="0" smtClean="0">
-                <a:solidFill>
-                  <a:schemeClr val="tx1"/>
-                </a:solidFill>
-              </a:endParaRPr>
-            </a:p>
-            <a:p>
-              <a:pPr algn="ctr"/>
-              <a:r>
-                <a:rPr lang="en-US" dirty="0" err="1" smtClean="0">
-                  <a:solidFill>
-                    <a:schemeClr val="tx1"/>
-                  </a:solidFill>
-                </a:rPr>
-                <a:t>owner_id</a:t>
-              </a:r>
-              <a:r>
-                <a:rPr lang="en-US" dirty="0" smtClean="0">
                   <a:solidFill>
                     <a:schemeClr val="tx1"/>
                   </a:solidFill>
@@ -7585,7 +7464,26 @@
             <a:p>
               <a:pPr algn="ctr"/>
               <a:r>
-                <a:rPr lang="en-US" dirty="0" err="1" smtClean="0">
+                <a:rPr lang="en-US" dirty="0" err="1">
+                  <a:solidFill>
+                    <a:schemeClr val="tx1"/>
+                  </a:solidFill>
+                </a:rPr>
+                <a:t>owner_id</a:t>
+              </a:r>
+              <a:r>
+                <a:rPr lang="en-US" dirty="0">
+                  <a:solidFill>
+                    <a:schemeClr val="tx1"/>
+                  </a:solidFill>
+                </a:rPr>
+                <a:t>: integer</a:t>
+              </a:r>
+            </a:p>
+            <a:p>
+              <a:pPr algn="ctr"/>
+              <a:r>
+                <a:rPr lang="en-US" dirty="0" err="1">
                   <a:solidFill>
                     <a:schemeClr val="tx1"/>
                   </a:solidFill>
@@ -7593,7 +7491,7 @@
                 <a:t>saving_path</a:t>
               </a:r>
               <a:r>
-                <a:rPr lang="en-US" dirty="0" smtClean="0">
+                <a:rPr lang="en-US" dirty="0">
                   <a:solidFill>
                     <a:schemeClr val="tx1"/>
                   </a:solidFill>
@@ -7604,7 +7502,7 @@
             <a:p>
               <a:pPr algn="ctr"/>
               <a:r>
-                <a:rPr lang="en-US" dirty="0" err="1" smtClean="0">
+                <a:rPr lang="en-US" dirty="0" err="1">
                   <a:solidFill>
                     <a:schemeClr val="tx1"/>
                   </a:solidFill>
@@ -7612,7 +7510,7 @@
                 <a:t>upload_date</a:t>
               </a:r>
               <a:r>
-                <a:rPr lang="en-US" dirty="0" smtClean="0">
+                <a:rPr lang="en-US" dirty="0">
                   <a:solidFill>
                     <a:schemeClr val="tx1"/>
                   </a:solidFill>
@@ -7684,7 +7582,7 @@
             <a:p>
               <a:pPr algn="ctr"/>
               <a:r>
-                <a:rPr lang="en-US" dirty="0" smtClean="0">
+                <a:rPr lang="en-US" dirty="0">
                   <a:solidFill>
                     <a:schemeClr val="tx1"/>
                   </a:solidFill>
@@ -7747,7 +7645,7 @@
             <a:p>
               <a:pPr algn="ctr"/>
               <a:r>
-                <a:rPr lang="en-US" dirty="0" err="1" smtClean="0">
+                <a:rPr lang="en-US" dirty="0" err="1">
                   <a:solidFill>
                     <a:schemeClr val="tx1"/>
                   </a:solidFill>
@@ -7755,7 +7653,7 @@
                 <a:t>privilege_id</a:t>
               </a:r>
               <a:r>
-                <a:rPr lang="en-US" dirty="0" smtClean="0">
+                <a:rPr lang="en-US" dirty="0">
                   <a:solidFill>
                     <a:schemeClr val="tx1"/>
                   </a:solidFill>
@@ -7766,7 +7664,7 @@
             <a:p>
               <a:pPr algn="ctr"/>
               <a:r>
-                <a:rPr lang="en-US" dirty="0" smtClean="0">
+                <a:rPr lang="en-US" dirty="0">
                   <a:solidFill>
                     <a:schemeClr val="tx1"/>
                   </a:solidFill>
@@ -7777,7 +7675,7 @@
             <a:p>
               <a:pPr algn="ctr"/>
               <a:r>
-                <a:rPr lang="en-US" dirty="0" err="1" smtClean="0">
+                <a:rPr lang="en-US" dirty="0" err="1">
                   <a:solidFill>
                     <a:schemeClr val="tx1"/>
                   </a:solidFill>
@@ -7785,7 +7683,7 @@
                 <a:t>is_displaying</a:t>
               </a:r>
               <a:r>
-                <a:rPr lang="en-US" dirty="0" smtClean="0">
+                <a:rPr lang="en-US" dirty="0">
                   <a:solidFill>
                     <a:schemeClr val="tx1"/>
                   </a:solidFill>
@@ -7801,18 +7699,10 @@
                     <a:schemeClr val="tx1"/>
                   </a:solidFill>
                 </a:rPr>
-                <a:t>k</a:t>
+                <a:t>key_name</a:t>
               </a:r>
               <a:r>
-                <a:rPr lang="en-US" dirty="0" err="1" smtClean="0">
-                  <a:solidFill>
-                    <a:schemeClr val="tx1"/>
-                  </a:solidFill>
-                </a:rPr>
-                <a:t>ey_name</a:t>
-              </a:r>
-              <a:r>
-                <a:rPr lang="en-US" dirty="0" smtClean="0">
+                <a:rPr lang="en-US" dirty="0">
                   <a:solidFill>
                     <a:schemeClr val="tx1"/>
                   </a:solidFill>
@@ -7823,7 +7713,7 @@
             <a:p>
               <a:pPr algn="ctr"/>
               <a:r>
-                <a:rPr lang="en-US" dirty="0" smtClean="0">
+                <a:rPr lang="en-US" dirty="0">
                   <a:solidFill>
                     <a:schemeClr val="tx1"/>
                   </a:solidFill>
@@ -7895,7 +7785,7 @@
             <a:p>
               <a:pPr algn="ctr"/>
               <a:r>
-                <a:rPr lang="en-US" dirty="0" smtClean="0">
+                <a:rPr lang="en-US" dirty="0">
                   <a:solidFill>
                     <a:schemeClr val="tx1"/>
                   </a:solidFill>
@@ -7958,7 +7848,7 @@
             <a:p>
               <a:pPr algn="ctr"/>
               <a:r>
-                <a:rPr lang="en-US" dirty="0" err="1" smtClean="0">
+                <a:rPr lang="en-US" dirty="0" err="1">
                   <a:solidFill>
                     <a:schemeClr val="tx1"/>
                   </a:solidFill>
@@ -7966,7 +7856,7 @@
                 <a:t>bill_id</a:t>
               </a:r>
               <a:r>
-                <a:rPr lang="en-US" dirty="0" smtClean="0">
+                <a:rPr lang="en-US" dirty="0">
                   <a:solidFill>
                     <a:schemeClr val="tx1"/>
                   </a:solidFill>
@@ -7977,7 +7867,7 @@
             <a:p>
               <a:pPr algn="ctr"/>
               <a:r>
-                <a:rPr lang="en-US" dirty="0" err="1" smtClean="0">
+                <a:rPr lang="en-US" dirty="0" err="1">
                   <a:solidFill>
                     <a:schemeClr val="tx1"/>
                   </a:solidFill>
@@ -7990,21 +7880,13 @@
                     <a:schemeClr val="tx1"/>
                   </a:solidFill>
                 </a:rPr>
-                <a:t>: </a:t>
-              </a:r>
-              <a:r>
-                <a:rPr lang="en-US" dirty="0" smtClean="0">
-                  <a:solidFill>
-                    <a:schemeClr val="tx1"/>
-                  </a:solidFill>
-                </a:rPr>
-                <a:t>integer</a:t>
+                <a:t>: integer</a:t>
               </a:r>
             </a:p>
             <a:p>
               <a:pPr algn="ctr"/>
               <a:r>
-                <a:rPr lang="en-US" dirty="0" err="1" smtClean="0">
+                <a:rPr lang="en-US" dirty="0" err="1">
                   <a:solidFill>
                     <a:schemeClr val="tx1"/>
                   </a:solidFill>
@@ -8012,7 +7894,7 @@
                 <a:t>is_active</a:t>
               </a:r>
               <a:r>
-                <a:rPr lang="en-US" dirty="0" smtClean="0">
+                <a:rPr lang="en-US" dirty="0">
                   <a:solidFill>
                     <a:schemeClr val="tx1"/>
                   </a:solidFill>
@@ -8020,14 +7902,14 @@
                 <a:t>: </a:t>
               </a:r>
               <a:r>
-                <a:rPr lang="en-US" dirty="0" err="1" smtClean="0">
+                <a:rPr lang="en-US" dirty="0" err="1">
                   <a:solidFill>
                     <a:schemeClr val="tx1"/>
                   </a:solidFill>
                 </a:rPr>
                 <a:t>boolean</a:t>
               </a:r>
-              <a:endParaRPr lang="en-US" dirty="0" smtClean="0">
+              <a:endParaRPr lang="en-US" dirty="0">
                 <a:solidFill>
                   <a:schemeClr val="tx1"/>
                 </a:solidFill>
@@ -8097,7 +7979,7 @@
             <a:p>
               <a:pPr algn="ctr"/>
               <a:r>
-                <a:rPr lang="en-US" dirty="0" smtClean="0">
+                <a:rPr lang="en-US" dirty="0">
                   <a:solidFill>
                     <a:schemeClr val="tx1"/>
                   </a:solidFill>
@@ -8160,7 +8042,7 @@
             <a:p>
               <a:pPr algn="ctr"/>
               <a:r>
-                <a:rPr lang="en-US" dirty="0" err="1" smtClean="0">
+                <a:rPr lang="en-US" dirty="0" err="1">
                   <a:solidFill>
                     <a:schemeClr val="tx1"/>
                   </a:solidFill>
@@ -8168,7 +8050,7 @@
                 <a:t>privilege_id</a:t>
               </a:r>
               <a:r>
-                <a:rPr lang="en-US" dirty="0" smtClean="0">
+                <a:rPr lang="en-US" dirty="0">
                   <a:solidFill>
                     <a:schemeClr val="tx1"/>
                   </a:solidFill>
@@ -8184,18 +8066,10 @@
                     <a:schemeClr val="tx1"/>
                   </a:solidFill>
                 </a:rPr>
-                <a:t>b</a:t>
+                <a:t>bill_id</a:t>
               </a:r>
               <a:r>
-                <a:rPr lang="en-US" dirty="0" err="1" smtClean="0">
-                  <a:solidFill>
-                    <a:schemeClr val="tx1"/>
-                  </a:solidFill>
-                </a:rPr>
-                <a:t>ill_id</a:t>
-              </a:r>
-              <a:r>
-                <a:rPr lang="en-US" dirty="0" smtClean="0">
+                <a:rPr lang="en-US" dirty="0">
                   <a:solidFill>
                     <a:schemeClr val="tx1"/>
                   </a:solidFill>
@@ -8267,7 +8141,7 @@
             <a:p>
               <a:pPr algn="ctr"/>
               <a:r>
-                <a:rPr lang="en-US" dirty="0" smtClean="0">
+                <a:rPr lang="en-US" dirty="0">
                   <a:solidFill>
                     <a:schemeClr val="tx1"/>
                   </a:solidFill>
@@ -8330,7 +8204,7 @@
             <a:p>
               <a:pPr algn="ctr"/>
               <a:r>
-                <a:rPr lang="en-US" dirty="0" err="1" smtClean="0">
+                <a:rPr lang="en-US" dirty="0" err="1">
                   <a:solidFill>
                     <a:schemeClr val="tx1"/>
                   </a:solidFill>
@@ -8338,7 +8212,7 @@
                 <a:t>user_id</a:t>
               </a:r>
               <a:r>
-                <a:rPr lang="en-US" dirty="0" smtClean="0">
+                <a:rPr lang="en-US" dirty="0">
                   <a:solidFill>
                     <a:schemeClr val="tx1"/>
                   </a:solidFill>
@@ -8349,7 +8223,7 @@
             <a:p>
               <a:pPr algn="ctr"/>
               <a:r>
-                <a:rPr lang="en-US" dirty="0" err="1" smtClean="0">
+                <a:rPr lang="en-US" dirty="0" err="1">
                   <a:solidFill>
                     <a:schemeClr val="tx1"/>
                   </a:solidFill>
@@ -8357,7 +8231,7 @@
                 <a:t>privilege_id</a:t>
               </a:r>
               <a:r>
-                <a:rPr lang="en-US" dirty="0" smtClean="0">
+                <a:rPr lang="en-US" dirty="0">
                   <a:solidFill>
                     <a:schemeClr val="tx1"/>
                   </a:solidFill>
@@ -8429,7 +8303,7 @@
             <a:p>
               <a:pPr algn="ctr"/>
               <a:r>
-                <a:rPr lang="en-US" dirty="0" smtClean="0">
+                <a:rPr lang="en-US" dirty="0">
                   <a:solidFill>
                     <a:schemeClr val="tx1"/>
                   </a:solidFill>
@@ -8492,7 +8366,7 @@
             <a:p>
               <a:pPr algn="ctr"/>
               <a:r>
-                <a:rPr lang="en-US" dirty="0" err="1" smtClean="0">
+                <a:rPr lang="en-US" dirty="0" err="1">
                   <a:solidFill>
                     <a:schemeClr val="tx1"/>
                   </a:solidFill>
@@ -8500,7 +8374,7 @@
                 <a:t>session_id</a:t>
               </a:r>
               <a:r>
-                <a:rPr lang="en-US" dirty="0" smtClean="0">
+                <a:rPr lang="en-US" dirty="0">
                   <a:solidFill>
                     <a:schemeClr val="tx1"/>
                   </a:solidFill>
@@ -8511,7 +8385,7 @@
             <a:p>
               <a:pPr algn="ctr"/>
               <a:r>
-                <a:rPr lang="en-US" dirty="0" err="1" smtClean="0">
+                <a:rPr lang="en-US" dirty="0" err="1">
                   <a:solidFill>
                     <a:schemeClr val="tx1"/>
                   </a:solidFill>
@@ -8519,7 +8393,7 @@
                 <a:t>saving_id</a:t>
               </a:r>
               <a:r>
-                <a:rPr lang="en-US" dirty="0" smtClean="0">
+                <a:rPr lang="en-US" dirty="0">
                   <a:solidFill>
                     <a:schemeClr val="tx1"/>
                   </a:solidFill>
@@ -8591,7 +8465,7 @@
             <a:p>
               <a:pPr algn="ctr"/>
               <a:r>
-                <a:rPr lang="en-US" dirty="0" smtClean="0">
+                <a:rPr lang="en-US" dirty="0">
                   <a:solidFill>
                     <a:schemeClr val="tx1"/>
                   </a:solidFill>
@@ -8654,7 +8528,7 @@
             <a:p>
               <a:pPr algn="ctr"/>
               <a:r>
-                <a:rPr lang="en-US" dirty="0" err="1" smtClean="0">
+                <a:rPr lang="en-US" dirty="0" err="1">
                   <a:solidFill>
                     <a:schemeClr val="tx1"/>
                   </a:solidFill>
@@ -8662,7 +8536,7 @@
                 <a:t>user_id</a:t>
               </a:r>
               <a:r>
-                <a:rPr lang="en-US" dirty="0" smtClean="0">
+                <a:rPr lang="en-US" dirty="0">
                   <a:solidFill>
                     <a:schemeClr val="tx1"/>
                   </a:solidFill>
@@ -8673,7 +8547,7 @@
             <a:p>
               <a:pPr algn="ctr"/>
               <a:r>
-                <a:rPr lang="en-US" dirty="0" err="1" smtClean="0">
+                <a:rPr lang="en-US" dirty="0" err="1">
                   <a:solidFill>
                     <a:schemeClr val="tx1"/>
                   </a:solidFill>
@@ -8681,7 +8555,7 @@
                 <a:t>session_id</a:t>
               </a:r>
               <a:r>
-                <a:rPr lang="en-US" dirty="0" smtClean="0">
+                <a:rPr lang="en-US" dirty="0">
                   <a:solidFill>
                     <a:schemeClr val="tx1"/>
                   </a:solidFill>
@@ -10248,20 +10122,17 @@
           </a:lstStyle>
           <a:p>
             <a:r>
-              <a:rPr lang="ru-RU" sz="6023" b="1" dirty="0" err="1" smtClean="0">
+              <a:rPr lang="ru-RU" sz="6023" b="1" dirty="0" err="1">
                 <a:latin typeface="Bahnschrift Condensed" panose="020B0502040204020203" pitchFamily="34" charset="0"/>
               </a:rPr>
               <a:t>Дискорд</a:t>
             </a:r>
             <a:r>
-              <a:rPr lang="ru-RU" sz="6023" b="1" dirty="0" smtClean="0">
+              <a:rPr lang="ru-RU" sz="6023" b="1" dirty="0">
                 <a:latin typeface="Bahnschrift Condensed" panose="020B0502040204020203" pitchFamily="34" charset="0"/>
               </a:rPr>
               <a:t>-бот</a:t>
             </a:r>
-            <a:endParaRPr lang="ru-RU" sz="6023" b="1" dirty="0">
-              <a:latin typeface="Bahnschrift Condensed" panose="020B0502040204020203" pitchFamily="34" charset="0"/>
-            </a:endParaRPr>
           </a:p>
         </p:txBody>
       </p:sp>
@@ -10299,13 +10170,6 @@
   <p:clrMapOvr>
     <a:masterClrMapping/>
   </p:clrMapOvr>
-  <p:timing>
-    <p:tnLst>
-      <p:par>
-        <p:cTn id="1" dur="indefinite" restart="never" nodeType="tmRoot"/>
-      </p:par>
-    </p:tnLst>
-  </p:timing>
 </p:sld>
 </file>
 
@@ -10374,14 +10238,11 @@
           </a:lstStyle>
           <a:p>
             <a:r>
-              <a:rPr lang="ru-RU" sz="6023" b="1" dirty="0" smtClean="0">
+              <a:rPr lang="ru-RU" sz="6023" b="1" dirty="0">
                 <a:latin typeface="Bahnschrift Condensed" panose="020B0502040204020203" pitchFamily="34" charset="0"/>
               </a:rPr>
               <a:t>Проверка сохранений</a:t>
             </a:r>
-            <a:endParaRPr lang="ru-RU" sz="6023" b="1" dirty="0">
-              <a:latin typeface="Bahnschrift Condensed" panose="020B0502040204020203" pitchFamily="34" charset="0"/>
-            </a:endParaRPr>
           </a:p>
         </p:txBody>
       </p:sp>
@@ -10417,7 +10278,7 @@
           <a:lstStyle/>
           <a:p>
             <a:r>
-              <a:rPr lang="en-US" sz="3600" dirty="0" err="1" smtClean="0"/>
+              <a:rPr lang="en-US" sz="3600" dirty="0" err="1"/>
               <a:t>BytesParser</a:t>
             </a:r>
             <a:endParaRPr lang="ru-RU" sz="3600" dirty="0"/>
@@ -10456,7 +10317,7 @@
           <a:lstStyle/>
           <a:p>
             <a:r>
-              <a:rPr lang="en-US" sz="3600" dirty="0" err="1" smtClean="0"/>
+              <a:rPr lang="en-US" sz="3600" dirty="0" err="1"/>
               <a:t>BytesParserSpecializer</a:t>
             </a:r>
             <a:endParaRPr lang="ru-RU" sz="3600" dirty="0"/>
@@ -10495,7 +10356,7 @@
           <a:lstStyle/>
           <a:p>
             <a:r>
-              <a:rPr lang="en-US" sz="3600" dirty="0" err="1" smtClean="0"/>
+              <a:rPr lang="en-US" sz="3600" dirty="0" err="1"/>
               <a:t>SatisfactorySaveParser</a:t>
             </a:r>
             <a:endParaRPr lang="ru-RU" sz="3600" dirty="0"/>
@@ -10612,15 +10473,15 @@
           <a:lstStyle/>
           <a:p>
             <a:r>
-              <a:rPr lang="en-US" sz="3600" dirty="0" smtClean="0"/>
+              <a:rPr lang="en-US" sz="3600" dirty="0"/>
               <a:t>.</a:t>
             </a:r>
             <a:r>
-              <a:rPr lang="en-US" sz="3600" dirty="0" err="1" smtClean="0"/>
+              <a:rPr lang="en-US" sz="3600" dirty="0" err="1"/>
               <a:t>sav</a:t>
             </a:r>
             <a:r>
-              <a:rPr lang="en-US" sz="3600" dirty="0" smtClean="0"/>
+              <a:rPr lang="en-US" sz="3600" dirty="0"/>
               <a:t> file</a:t>
             </a:r>
             <a:endParaRPr lang="ru-RU" sz="3600" dirty="0"/>
@@ -10737,7 +10598,7 @@
           <a:lstStyle/>
           <a:p>
             <a:r>
-              <a:rPr lang="en-US" sz="3600" dirty="0" smtClean="0"/>
+              <a:rPr lang="en-US" sz="3600" dirty="0"/>
               <a:t>bytes file</a:t>
             </a:r>
             <a:endParaRPr lang="ru-RU" sz="3600" dirty="0"/>
@@ -10776,7 +10637,7 @@
           <a:lstStyle/>
           <a:p>
             <a:r>
-              <a:rPr lang="en-US" sz="3600" dirty="0" smtClean="0"/>
+              <a:rPr lang="en-US" sz="3600" dirty="0"/>
               <a:t>int32</a:t>
             </a:r>
             <a:endParaRPr lang="ru-RU" sz="3600" dirty="0"/>
@@ -10854,7 +10715,7 @@
           <a:lstStyle/>
           <a:p>
             <a:r>
-              <a:rPr lang="en-US" sz="3600" dirty="0" smtClean="0"/>
+              <a:rPr lang="en-US" sz="3600" dirty="0"/>
               <a:t>int64</a:t>
             </a:r>
             <a:endParaRPr lang="ru-RU" sz="3600" dirty="0"/>
@@ -10932,7 +10793,7 @@
           <a:lstStyle/>
           <a:p>
             <a:r>
-              <a:rPr lang="en-US" sz="3600" dirty="0" smtClean="0"/>
+              <a:rPr lang="en-US" sz="3600" dirty="0"/>
               <a:t> string</a:t>
             </a:r>
             <a:endParaRPr lang="ru-RU" sz="3600" dirty="0"/>
@@ -11010,7 +10871,7 @@
           <a:lstStyle/>
           <a:p>
             <a:r>
-              <a:rPr lang="en-US" sz="3600" dirty="0" smtClean="0"/>
+              <a:rPr lang="en-US" sz="3600" dirty="0"/>
               <a:t>4 bytes</a:t>
             </a:r>
             <a:endParaRPr lang="ru-RU" sz="3600" dirty="0"/>
@@ -11049,7 +10910,7 @@
           <a:lstStyle/>
           <a:p>
             <a:r>
-              <a:rPr lang="en-US" sz="3600" dirty="0" smtClean="0"/>
+              <a:rPr lang="en-US" sz="3600" dirty="0"/>
               <a:t>8 bytes</a:t>
             </a:r>
             <a:endParaRPr lang="ru-RU" sz="3600" dirty="0"/>
@@ -11166,7 +11027,7 @@
           <a:lstStyle/>
           <a:p>
             <a:r>
-              <a:rPr lang="en-US" sz="3600" dirty="0" err="1" smtClean="0"/>
+              <a:rPr lang="en-US" sz="3600" dirty="0" err="1"/>
               <a:t>len</a:t>
             </a:r>
             <a:endParaRPr lang="ru-RU" sz="3600" dirty="0"/>
@@ -11205,7 +11066,7 @@
           <a:lstStyle/>
           <a:p>
             <a:r>
-              <a:rPr lang="en-US" sz="3600" dirty="0" smtClean="0"/>
+              <a:rPr lang="en-US" sz="3600" dirty="0"/>
               <a:t>bytes string</a:t>
             </a:r>
             <a:endParaRPr lang="ru-RU" sz="3600" dirty="0"/>
@@ -11216,7 +11077,7 @@
         <p:nvCxnSpPr>
           <p:cNvPr id="68" name="Прямая со стрелкой 67"/>
           <p:cNvCxnSpPr>
-            <a:stCxn id="63" idx="0"/>
+            <a:cxnSpLocks/>
             <a:endCxn id="57" idx="2"/>
           </p:cNvCxnSpPr>
           <p:nvPr/>
@@ -11224,7 +11085,7 @@
         <p:spPr>
           <a:xfrm flipH="1" flipV="1">
             <a:off x="7378499" y="4534485"/>
-            <a:ext cx="955968" cy="1337485"/>
+            <a:ext cx="766332" cy="1337485"/>
           </a:xfrm>
           <a:prstGeom prst="straightConnector1">
             <a:avLst/>
@@ -11255,15 +11116,15 @@
         <p:nvCxnSpPr>
           <p:cNvPr id="70" name="Прямая со стрелкой 69"/>
           <p:cNvCxnSpPr>
-            <a:stCxn id="63" idx="0"/>
+            <a:cxnSpLocks/>
             <a:endCxn id="58" idx="2"/>
           </p:cNvCxnSpPr>
           <p:nvPr/>
         </p:nvCxnSpPr>
         <p:spPr>
           <a:xfrm flipV="1">
-            <a:off x="8334467" y="4534484"/>
-            <a:ext cx="844675" cy="1337486"/>
+            <a:off x="8566004" y="4534484"/>
+            <a:ext cx="613138" cy="1337486"/>
           </a:xfrm>
           <a:prstGeom prst="straightConnector1">
             <a:avLst/>
@@ -11424,7 +11285,7 @@
           <a:lstStyle/>
           <a:p>
             <a:r>
-              <a:rPr lang="en-US" sz="3600" b="1" dirty="0" smtClean="0"/>
+              <a:rPr lang="en-US" sz="3600" b="1" dirty="0"/>
               <a:t>+</a:t>
             </a:r>
             <a:endParaRPr lang="ru-RU" sz="3600" b="1" dirty="0"/>

</xml_diff>